<commit_message>
Updates to get-started-w-pbi from Obvience
</commit_message>
<xml_diff>
--- a/learn-bizapps-pr/power-bi/get-started-with-power-bi/media-layered/source-get-started-with-power-bi.pptx
+++ b/learn-bizapps-pr/power-bi/get-started-with-power-bi/media-layered/source-get-started-with-power-bi.pptx
@@ -5,11 +5,27 @@
     <p:sldMasterId id="2147483648" r:id="rId1"/>
   </p:sldMasterIdLst>
   <p:notesMasterIdLst>
-    <p:notesMasterId r:id="rId4"/>
+    <p:notesMasterId r:id="rId20"/>
   </p:notesMasterIdLst>
   <p:sldIdLst>
     <p:sldId id="256" r:id="rId2"/>
     <p:sldId id="257" r:id="rId3"/>
+    <p:sldId id="258" r:id="rId4"/>
+    <p:sldId id="259" r:id="rId5"/>
+    <p:sldId id="260" r:id="rId6"/>
+    <p:sldId id="261" r:id="rId7"/>
+    <p:sldId id="262" r:id="rId8"/>
+    <p:sldId id="263" r:id="rId9"/>
+    <p:sldId id="264" r:id="rId10"/>
+    <p:sldId id="265" r:id="rId11"/>
+    <p:sldId id="266" r:id="rId12"/>
+    <p:sldId id="267" r:id="rId13"/>
+    <p:sldId id="268" r:id="rId14"/>
+    <p:sldId id="269" r:id="rId15"/>
+    <p:sldId id="270" r:id="rId16"/>
+    <p:sldId id="271" r:id="rId17"/>
+    <p:sldId id="272" r:id="rId18"/>
+    <p:sldId id="273" r:id="rId19"/>
   </p:sldIdLst>
   <p:sldSz cx="12192000" cy="6858000"/>
   <p:notesSz cx="6858000" cy="9144000"/>
@@ -198,7 +214,7 @@
           <a:p>
             <a:fld id="{B9D4B0F7-34C3-458A-B111-A2861A0008BA}" type="datetimeFigureOut">
               <a:rPr lang="en-US" smtClean="0"/>
-              <a:t>12/28/2019</a:t>
+              <a:t>2/17/2021</a:t>
             </a:fld>
             <a:endParaRPr lang="en-US"/>
           </a:p>
@@ -708,7 +724,7 @@
           <a:p>
             <a:fld id="{7B75BD6A-157E-4C51-8748-DBA6770A0648}" type="datetimeFigureOut">
               <a:rPr lang="en-US" smtClean="0"/>
-              <a:t>12/28/2019</a:t>
+              <a:t>2/17/2021</a:t>
             </a:fld>
             <a:endParaRPr lang="en-US"/>
           </a:p>
@@ -906,7 +922,7 @@
           <a:p>
             <a:fld id="{7B75BD6A-157E-4C51-8748-DBA6770A0648}" type="datetimeFigureOut">
               <a:rPr lang="en-US" smtClean="0"/>
-              <a:t>12/28/2019</a:t>
+              <a:t>2/17/2021</a:t>
             </a:fld>
             <a:endParaRPr lang="en-US"/>
           </a:p>
@@ -1114,7 +1130,7 @@
           <a:p>
             <a:fld id="{7B75BD6A-157E-4C51-8748-DBA6770A0648}" type="datetimeFigureOut">
               <a:rPr lang="en-US" smtClean="0"/>
-              <a:t>12/28/2019</a:t>
+              <a:t>2/17/2021</a:t>
             </a:fld>
             <a:endParaRPr lang="en-US"/>
           </a:p>
@@ -1312,7 +1328,7 @@
           <a:p>
             <a:fld id="{7B75BD6A-157E-4C51-8748-DBA6770A0648}" type="datetimeFigureOut">
               <a:rPr lang="en-US" smtClean="0"/>
-              <a:t>12/28/2019</a:t>
+              <a:t>2/17/2021</a:t>
             </a:fld>
             <a:endParaRPr lang="en-US"/>
           </a:p>
@@ -1587,7 +1603,7 @@
           <a:p>
             <a:fld id="{7B75BD6A-157E-4C51-8748-DBA6770A0648}" type="datetimeFigureOut">
               <a:rPr lang="en-US" smtClean="0"/>
-              <a:t>12/28/2019</a:t>
+              <a:t>2/17/2021</a:t>
             </a:fld>
             <a:endParaRPr lang="en-US"/>
           </a:p>
@@ -1852,7 +1868,7 @@
           <a:p>
             <a:fld id="{7B75BD6A-157E-4C51-8748-DBA6770A0648}" type="datetimeFigureOut">
               <a:rPr lang="en-US" smtClean="0"/>
-              <a:t>12/28/2019</a:t>
+              <a:t>2/17/2021</a:t>
             </a:fld>
             <a:endParaRPr lang="en-US"/>
           </a:p>
@@ -2264,7 +2280,7 @@
           <a:p>
             <a:fld id="{7B75BD6A-157E-4C51-8748-DBA6770A0648}" type="datetimeFigureOut">
               <a:rPr lang="en-US" smtClean="0"/>
-              <a:t>12/28/2019</a:t>
+              <a:t>2/17/2021</a:t>
             </a:fld>
             <a:endParaRPr lang="en-US"/>
           </a:p>
@@ -2405,7 +2421,7 @@
           <a:p>
             <a:fld id="{7B75BD6A-157E-4C51-8748-DBA6770A0648}" type="datetimeFigureOut">
               <a:rPr lang="en-US" smtClean="0"/>
-              <a:t>12/28/2019</a:t>
+              <a:t>2/17/2021</a:t>
             </a:fld>
             <a:endParaRPr lang="en-US"/>
           </a:p>
@@ -2518,7 +2534,7 @@
           <a:p>
             <a:fld id="{7B75BD6A-157E-4C51-8748-DBA6770A0648}" type="datetimeFigureOut">
               <a:rPr lang="en-US" smtClean="0"/>
-              <a:t>12/28/2019</a:t>
+              <a:t>2/17/2021</a:t>
             </a:fld>
             <a:endParaRPr lang="en-US"/>
           </a:p>
@@ -2829,7 +2845,7 @@
           <a:p>
             <a:fld id="{7B75BD6A-157E-4C51-8748-DBA6770A0648}" type="datetimeFigureOut">
               <a:rPr lang="en-US" smtClean="0"/>
-              <a:t>12/28/2019</a:t>
+              <a:t>2/17/2021</a:t>
             </a:fld>
             <a:endParaRPr lang="en-US"/>
           </a:p>
@@ -3117,7 +3133,7 @@
           <a:p>
             <a:fld id="{7B75BD6A-157E-4C51-8748-DBA6770A0648}" type="datetimeFigureOut">
               <a:rPr lang="en-US" smtClean="0"/>
-              <a:t>12/28/2019</a:t>
+              <a:t>2/17/2021</a:t>
             </a:fld>
             <a:endParaRPr lang="en-US"/>
           </a:p>
@@ -3358,7 +3374,7 @@
           <a:p>
             <a:fld id="{7B75BD6A-157E-4C51-8748-DBA6770A0648}" type="datetimeFigureOut">
               <a:rPr lang="en-US" smtClean="0"/>
-              <a:t>12/28/2019</a:t>
+              <a:t>2/17/2021</a:t>
             </a:fld>
             <a:endParaRPr lang="en-US"/>
           </a:p>
@@ -3927,7 +3943,7 @@
 </p:sld>
 </file>
 
-<file path=ppt/slides/slide2.xml><?xml version="1.0" encoding="utf-8"?>
+<file path=ppt/slides/slide10.xml><?xml version="1.0" encoding="utf-8"?>
 <p:sld xmlns:a="http://schemas.openxmlformats.org/drawingml/2006/main" xmlns:r="http://schemas.openxmlformats.org/officeDocument/2006/relationships" xmlns:p="http://schemas.openxmlformats.org/presentationml/2006/main">
   <p:cSld>
     <p:spTree>
@@ -3944,41 +3960,6 @@
           <a:chExt cx="0" cy="0"/>
         </a:xfrm>
       </p:grpSpPr>
-      <p:pic>
-        <p:nvPicPr>
-          <p:cNvPr id="4" name="Picture 3">
-            <a:extLst>
-              <a:ext uri="{FF2B5EF4-FFF2-40B4-BE49-F238E27FC236}">
-                <a16:creationId xmlns:a16="http://schemas.microsoft.com/office/drawing/2014/main" id="{CEDF9220-9703-4E2E-8F8C-53DB416F97B4}"/>
-              </a:ext>
-            </a:extLst>
-          </p:cNvPr>
-          <p:cNvPicPr>
-            <a:picLocks noChangeAspect="1"/>
-          </p:cNvPicPr>
-          <p:nvPr/>
-        </p:nvPicPr>
-        <p:blipFill>
-          <a:blip r:embed="rId2"/>
-          <a:stretch>
-            <a:fillRect/>
-          </a:stretch>
-        </p:blipFill>
-        <p:spPr>
-          <a:xfrm>
-            <a:off x="1285118" y="163322"/>
-            <a:ext cx="9422987" cy="6429983"/>
-          </a:xfrm>
-          <a:prstGeom prst="rect">
-            <a:avLst/>
-          </a:prstGeom>
-          <a:ln w="12700">
-            <a:solidFill>
-              <a:srgbClr val="C3C3C3"/>
-            </a:solidFill>
-          </a:ln>
-        </p:spPr>
-      </p:pic>
       <p:sp>
         <p:nvSpPr>
           <p:cNvPr id="5" name="Rectangle 4">
@@ -4031,10 +4012,1933 @@
           </a:p>
         </p:txBody>
       </p:sp>
+      <p:pic>
+        <p:nvPicPr>
+          <p:cNvPr id="3" name="Picture 2" descr="Graphical user interface, application&#10;&#10;Description automatically generated">
+            <a:extLst>
+              <a:ext uri="{FF2B5EF4-FFF2-40B4-BE49-F238E27FC236}">
+                <a16:creationId xmlns:a16="http://schemas.microsoft.com/office/drawing/2014/main" id="{E33EA576-C0D7-4A1D-B3EF-E0CE2C5CA939}"/>
+              </a:ext>
+            </a:extLst>
+          </p:cNvPr>
+          <p:cNvPicPr>
+            <a:picLocks noChangeAspect="1"/>
+          </p:cNvPicPr>
+          <p:nvPr/>
+        </p:nvPicPr>
+        <p:blipFill>
+          <a:blip r:embed="rId2">
+            <a:extLst>
+              <a:ext uri="{28A0092B-C50C-407E-A947-70E740481C1C}">
+                <a14:useLocalDpi xmlns:a14="http://schemas.microsoft.com/office/drawing/2010/main" val="0"/>
+              </a:ext>
+            </a:extLst>
+          </a:blip>
+          <a:stretch>
+            <a:fillRect/>
+          </a:stretch>
+        </p:blipFill>
+        <p:spPr>
+          <a:xfrm>
+            <a:off x="3987691" y="2485976"/>
+            <a:ext cx="4216617" cy="1886047"/>
+          </a:xfrm>
+          <a:prstGeom prst="rect">
+            <a:avLst/>
+          </a:prstGeom>
+        </p:spPr>
+      </p:pic>
+    </p:spTree>
+    <p:extLst>
+      <p:ext uri="{BB962C8B-B14F-4D97-AF65-F5344CB8AC3E}">
+        <p14:creationId xmlns:p14="http://schemas.microsoft.com/office/powerpoint/2010/main" val="4162835363"/>
+      </p:ext>
+    </p:extLst>
+  </p:cSld>
+  <p:clrMapOvr>
+    <a:masterClrMapping/>
+  </p:clrMapOvr>
+</p:sld>
+</file>
+
+<file path=ppt/slides/slide11.xml><?xml version="1.0" encoding="utf-8"?>
+<p:sld xmlns:a="http://schemas.openxmlformats.org/drawingml/2006/main" xmlns:r="http://schemas.openxmlformats.org/officeDocument/2006/relationships" xmlns:p="http://schemas.openxmlformats.org/presentationml/2006/main">
+  <p:cSld>
+    <p:spTree>
+      <p:nvGrpSpPr>
+        <p:cNvPr id="1" name=""/>
+        <p:cNvGrpSpPr/>
+        <p:nvPr/>
+      </p:nvGrpSpPr>
+      <p:grpSpPr>
+        <a:xfrm>
+          <a:off x="0" y="0"/>
+          <a:ext cx="0" cy="0"/>
+          <a:chOff x="0" y="0"/>
+          <a:chExt cx="0" cy="0"/>
+        </a:xfrm>
+      </p:grpSpPr>
+      <p:sp>
+        <p:nvSpPr>
+          <p:cNvPr id="5" name="Rectangle 4">
+            <a:extLst>
+              <a:ext uri="{FF2B5EF4-FFF2-40B4-BE49-F238E27FC236}">
+                <a16:creationId xmlns:a16="http://schemas.microsoft.com/office/drawing/2014/main" id="{A561EEED-B792-44E2-818C-90F789C91561}"/>
+              </a:ext>
+            </a:extLst>
+          </p:cNvPr>
+          <p:cNvSpPr/>
+          <p:nvPr/>
+        </p:nvSpPr>
+        <p:spPr>
+          <a:xfrm>
+            <a:off x="9901989" y="264695"/>
+            <a:ext cx="806116" cy="144379"/>
+          </a:xfrm>
+          <a:prstGeom prst="rect">
+            <a:avLst/>
+          </a:prstGeom>
+          <a:solidFill>
+            <a:schemeClr val="bg1"/>
+          </a:solidFill>
+          <a:ln>
+            <a:noFill/>
+          </a:ln>
+        </p:spPr>
+        <p:style>
+          <a:lnRef idx="2">
+            <a:schemeClr val="accent1">
+              <a:shade val="50000"/>
+            </a:schemeClr>
+          </a:lnRef>
+          <a:fillRef idx="1">
+            <a:schemeClr val="accent1"/>
+          </a:fillRef>
+          <a:effectRef idx="0">
+            <a:schemeClr val="accent1"/>
+          </a:effectRef>
+          <a:fontRef idx="minor">
+            <a:schemeClr val="lt1"/>
+          </a:fontRef>
+        </p:style>
+        <p:txBody>
+          <a:bodyPr rtlCol="0" anchor="ctr"/>
+          <a:lstStyle/>
+          <a:p>
+            <a:pPr algn="ctr"/>
+            <a:endParaRPr lang="en-US"/>
+          </a:p>
+        </p:txBody>
+      </p:sp>
+      <p:pic>
+        <p:nvPicPr>
+          <p:cNvPr id="3" name="Picture 2">
+            <a:extLst>
+              <a:ext uri="{FF2B5EF4-FFF2-40B4-BE49-F238E27FC236}">
+                <a16:creationId xmlns:a16="http://schemas.microsoft.com/office/drawing/2014/main" id="{174B6DB0-167D-419E-8AFB-4587B8A05C8F}"/>
+              </a:ext>
+            </a:extLst>
+          </p:cNvPr>
+          <p:cNvPicPr>
+            <a:picLocks noChangeAspect="1"/>
+          </p:cNvPicPr>
+          <p:nvPr/>
+        </p:nvPicPr>
+        <p:blipFill>
+          <a:blip r:embed="rId2">
+            <a:extLst>
+              <a:ext uri="{28A0092B-C50C-407E-A947-70E740481C1C}">
+                <a14:useLocalDpi xmlns:a14="http://schemas.microsoft.com/office/drawing/2010/main" val="0"/>
+              </a:ext>
+            </a:extLst>
+          </a:blip>
+          <a:stretch>
+            <a:fillRect/>
+          </a:stretch>
+        </p:blipFill>
+        <p:spPr>
+          <a:xfrm>
+            <a:off x="1285948" y="0"/>
+            <a:ext cx="9620104" cy="6858000"/>
+          </a:xfrm>
+          <a:prstGeom prst="rect">
+            <a:avLst/>
+          </a:prstGeom>
+        </p:spPr>
+      </p:pic>
+    </p:spTree>
+    <p:extLst>
+      <p:ext uri="{BB962C8B-B14F-4D97-AF65-F5344CB8AC3E}">
+        <p14:creationId xmlns:p14="http://schemas.microsoft.com/office/powerpoint/2010/main" val="1818500659"/>
+      </p:ext>
+    </p:extLst>
+  </p:cSld>
+  <p:clrMapOvr>
+    <a:masterClrMapping/>
+  </p:clrMapOvr>
+</p:sld>
+</file>
+
+<file path=ppt/slides/slide12.xml><?xml version="1.0" encoding="utf-8"?>
+<p:sld xmlns:a="http://schemas.openxmlformats.org/drawingml/2006/main" xmlns:r="http://schemas.openxmlformats.org/officeDocument/2006/relationships" xmlns:p="http://schemas.openxmlformats.org/presentationml/2006/main">
+  <p:cSld>
+    <p:spTree>
+      <p:nvGrpSpPr>
+        <p:cNvPr id="1" name=""/>
+        <p:cNvGrpSpPr/>
+        <p:nvPr/>
+      </p:nvGrpSpPr>
+      <p:grpSpPr>
+        <a:xfrm>
+          <a:off x="0" y="0"/>
+          <a:ext cx="0" cy="0"/>
+          <a:chOff x="0" y="0"/>
+          <a:chExt cx="0" cy="0"/>
+        </a:xfrm>
+      </p:grpSpPr>
+      <p:sp>
+        <p:nvSpPr>
+          <p:cNvPr id="5" name="Rectangle 4">
+            <a:extLst>
+              <a:ext uri="{FF2B5EF4-FFF2-40B4-BE49-F238E27FC236}">
+                <a16:creationId xmlns:a16="http://schemas.microsoft.com/office/drawing/2014/main" id="{A561EEED-B792-44E2-818C-90F789C91561}"/>
+              </a:ext>
+            </a:extLst>
+          </p:cNvPr>
+          <p:cNvSpPr/>
+          <p:nvPr/>
+        </p:nvSpPr>
+        <p:spPr>
+          <a:xfrm>
+            <a:off x="9901989" y="264695"/>
+            <a:ext cx="806116" cy="144379"/>
+          </a:xfrm>
+          <a:prstGeom prst="rect">
+            <a:avLst/>
+          </a:prstGeom>
+          <a:solidFill>
+            <a:schemeClr val="bg1"/>
+          </a:solidFill>
+          <a:ln>
+            <a:noFill/>
+          </a:ln>
+        </p:spPr>
+        <p:style>
+          <a:lnRef idx="2">
+            <a:schemeClr val="accent1">
+              <a:shade val="50000"/>
+            </a:schemeClr>
+          </a:lnRef>
+          <a:fillRef idx="1">
+            <a:schemeClr val="accent1"/>
+          </a:fillRef>
+          <a:effectRef idx="0">
+            <a:schemeClr val="accent1"/>
+          </a:effectRef>
+          <a:fontRef idx="minor">
+            <a:schemeClr val="lt1"/>
+          </a:fontRef>
+        </p:style>
+        <p:txBody>
+          <a:bodyPr rtlCol="0" anchor="ctr"/>
+          <a:lstStyle/>
+          <a:p>
+            <a:pPr algn="ctr"/>
+            <a:endParaRPr lang="en-US"/>
+          </a:p>
+        </p:txBody>
+      </p:sp>
+      <p:pic>
+        <p:nvPicPr>
+          <p:cNvPr id="3" name="Picture 2" descr="Graphical user interface, application&#10;&#10;Description automatically generated">
+            <a:extLst>
+              <a:ext uri="{FF2B5EF4-FFF2-40B4-BE49-F238E27FC236}">
+                <a16:creationId xmlns:a16="http://schemas.microsoft.com/office/drawing/2014/main" id="{956C61C7-D777-4970-A6DE-778BC553F90D}"/>
+              </a:ext>
+            </a:extLst>
+          </p:cNvPr>
+          <p:cNvPicPr>
+            <a:picLocks noChangeAspect="1"/>
+          </p:cNvPicPr>
+          <p:nvPr/>
+        </p:nvPicPr>
+        <p:blipFill>
+          <a:blip r:embed="rId2">
+            <a:extLst>
+              <a:ext uri="{28A0092B-C50C-407E-A947-70E740481C1C}">
+                <a14:useLocalDpi xmlns:a14="http://schemas.microsoft.com/office/drawing/2010/main" val="0"/>
+              </a:ext>
+            </a:extLst>
+          </a:blip>
+          <a:stretch>
+            <a:fillRect/>
+          </a:stretch>
+        </p:blipFill>
+        <p:spPr>
+          <a:xfrm>
+            <a:off x="1276102" y="18874"/>
+            <a:ext cx="9639795" cy="6820251"/>
+          </a:xfrm>
+          <a:prstGeom prst="rect">
+            <a:avLst/>
+          </a:prstGeom>
+        </p:spPr>
+      </p:pic>
+    </p:spTree>
+    <p:extLst>
+      <p:ext uri="{BB962C8B-B14F-4D97-AF65-F5344CB8AC3E}">
+        <p14:creationId xmlns:p14="http://schemas.microsoft.com/office/powerpoint/2010/main" val="1157847103"/>
+      </p:ext>
+    </p:extLst>
+  </p:cSld>
+  <p:clrMapOvr>
+    <a:masterClrMapping/>
+  </p:clrMapOvr>
+</p:sld>
+</file>
+
+<file path=ppt/slides/slide13.xml><?xml version="1.0" encoding="utf-8"?>
+<p:sld xmlns:a="http://schemas.openxmlformats.org/drawingml/2006/main" xmlns:r="http://schemas.openxmlformats.org/officeDocument/2006/relationships" xmlns:p="http://schemas.openxmlformats.org/presentationml/2006/main">
+  <p:cSld>
+    <p:spTree>
+      <p:nvGrpSpPr>
+        <p:cNvPr id="1" name=""/>
+        <p:cNvGrpSpPr/>
+        <p:nvPr/>
+      </p:nvGrpSpPr>
+      <p:grpSpPr>
+        <a:xfrm>
+          <a:off x="0" y="0"/>
+          <a:ext cx="0" cy="0"/>
+          <a:chOff x="0" y="0"/>
+          <a:chExt cx="0" cy="0"/>
+        </a:xfrm>
+      </p:grpSpPr>
+      <p:sp>
+        <p:nvSpPr>
+          <p:cNvPr id="5" name="Rectangle 4">
+            <a:extLst>
+              <a:ext uri="{FF2B5EF4-FFF2-40B4-BE49-F238E27FC236}">
+                <a16:creationId xmlns:a16="http://schemas.microsoft.com/office/drawing/2014/main" id="{A561EEED-B792-44E2-818C-90F789C91561}"/>
+              </a:ext>
+            </a:extLst>
+          </p:cNvPr>
+          <p:cNvSpPr/>
+          <p:nvPr/>
+        </p:nvSpPr>
+        <p:spPr>
+          <a:xfrm>
+            <a:off x="9901989" y="264695"/>
+            <a:ext cx="806116" cy="144379"/>
+          </a:xfrm>
+          <a:prstGeom prst="rect">
+            <a:avLst/>
+          </a:prstGeom>
+          <a:solidFill>
+            <a:schemeClr val="bg1"/>
+          </a:solidFill>
+          <a:ln>
+            <a:noFill/>
+          </a:ln>
+        </p:spPr>
+        <p:style>
+          <a:lnRef idx="2">
+            <a:schemeClr val="accent1">
+              <a:shade val="50000"/>
+            </a:schemeClr>
+          </a:lnRef>
+          <a:fillRef idx="1">
+            <a:schemeClr val="accent1"/>
+          </a:fillRef>
+          <a:effectRef idx="0">
+            <a:schemeClr val="accent1"/>
+          </a:effectRef>
+          <a:fontRef idx="minor">
+            <a:schemeClr val="lt1"/>
+          </a:fontRef>
+        </p:style>
+        <p:txBody>
+          <a:bodyPr rtlCol="0" anchor="ctr"/>
+          <a:lstStyle/>
+          <a:p>
+            <a:pPr algn="ctr"/>
+            <a:endParaRPr lang="en-US"/>
+          </a:p>
+        </p:txBody>
+      </p:sp>
+      <p:pic>
+        <p:nvPicPr>
+          <p:cNvPr id="3" name="Picture 2" descr="Graphical user interface&#10;&#10;Description automatically generated">
+            <a:extLst>
+              <a:ext uri="{FF2B5EF4-FFF2-40B4-BE49-F238E27FC236}">
+                <a16:creationId xmlns:a16="http://schemas.microsoft.com/office/drawing/2014/main" id="{65F1062E-E3DF-4907-97A2-5858C3C7D935}"/>
+              </a:ext>
+            </a:extLst>
+          </p:cNvPr>
+          <p:cNvPicPr>
+            <a:picLocks noChangeAspect="1"/>
+          </p:cNvPicPr>
+          <p:nvPr/>
+        </p:nvPicPr>
+        <p:blipFill>
+          <a:blip r:embed="rId2">
+            <a:extLst>
+              <a:ext uri="{28A0092B-C50C-407E-A947-70E740481C1C}">
+                <a14:useLocalDpi xmlns:a14="http://schemas.microsoft.com/office/drawing/2010/main" val="0"/>
+              </a:ext>
+            </a:extLst>
+          </a:blip>
+          <a:stretch>
+            <a:fillRect/>
+          </a:stretch>
+        </p:blipFill>
+        <p:spPr>
+          <a:xfrm>
+            <a:off x="981293" y="0"/>
+            <a:ext cx="10229413" cy="6858000"/>
+          </a:xfrm>
+          <a:prstGeom prst="rect">
+            <a:avLst/>
+          </a:prstGeom>
+        </p:spPr>
+      </p:pic>
+    </p:spTree>
+    <p:extLst>
+      <p:ext uri="{BB962C8B-B14F-4D97-AF65-F5344CB8AC3E}">
+        <p14:creationId xmlns:p14="http://schemas.microsoft.com/office/powerpoint/2010/main" val="2153326155"/>
+      </p:ext>
+    </p:extLst>
+  </p:cSld>
+  <p:clrMapOvr>
+    <a:masterClrMapping/>
+  </p:clrMapOvr>
+</p:sld>
+</file>
+
+<file path=ppt/slides/slide14.xml><?xml version="1.0" encoding="utf-8"?>
+<p:sld xmlns:a="http://schemas.openxmlformats.org/drawingml/2006/main" xmlns:r="http://schemas.openxmlformats.org/officeDocument/2006/relationships" xmlns:p="http://schemas.openxmlformats.org/presentationml/2006/main">
+  <p:cSld>
+    <p:spTree>
+      <p:nvGrpSpPr>
+        <p:cNvPr id="1" name=""/>
+        <p:cNvGrpSpPr/>
+        <p:nvPr/>
+      </p:nvGrpSpPr>
+      <p:grpSpPr>
+        <a:xfrm>
+          <a:off x="0" y="0"/>
+          <a:ext cx="0" cy="0"/>
+          <a:chOff x="0" y="0"/>
+          <a:chExt cx="0" cy="0"/>
+        </a:xfrm>
+      </p:grpSpPr>
+      <p:sp>
+        <p:nvSpPr>
+          <p:cNvPr id="5" name="Rectangle 4">
+            <a:extLst>
+              <a:ext uri="{FF2B5EF4-FFF2-40B4-BE49-F238E27FC236}">
+                <a16:creationId xmlns:a16="http://schemas.microsoft.com/office/drawing/2014/main" id="{A561EEED-B792-44E2-818C-90F789C91561}"/>
+              </a:ext>
+            </a:extLst>
+          </p:cNvPr>
+          <p:cNvSpPr/>
+          <p:nvPr/>
+        </p:nvSpPr>
+        <p:spPr>
+          <a:xfrm>
+            <a:off x="9901989" y="264695"/>
+            <a:ext cx="806116" cy="144379"/>
+          </a:xfrm>
+          <a:prstGeom prst="rect">
+            <a:avLst/>
+          </a:prstGeom>
+          <a:solidFill>
+            <a:schemeClr val="bg1"/>
+          </a:solidFill>
+          <a:ln>
+            <a:noFill/>
+          </a:ln>
+        </p:spPr>
+        <p:style>
+          <a:lnRef idx="2">
+            <a:schemeClr val="accent1">
+              <a:shade val="50000"/>
+            </a:schemeClr>
+          </a:lnRef>
+          <a:fillRef idx="1">
+            <a:schemeClr val="accent1"/>
+          </a:fillRef>
+          <a:effectRef idx="0">
+            <a:schemeClr val="accent1"/>
+          </a:effectRef>
+          <a:fontRef idx="minor">
+            <a:schemeClr val="lt1"/>
+          </a:fontRef>
+        </p:style>
+        <p:txBody>
+          <a:bodyPr rtlCol="0" anchor="ctr"/>
+          <a:lstStyle/>
+          <a:p>
+            <a:pPr algn="ctr"/>
+            <a:endParaRPr lang="en-US"/>
+          </a:p>
+        </p:txBody>
+      </p:sp>
+      <p:pic>
+        <p:nvPicPr>
+          <p:cNvPr id="3" name="Picture 2" descr="Chart&#10;&#10;Description automatically generated">
+            <a:extLst>
+              <a:ext uri="{FF2B5EF4-FFF2-40B4-BE49-F238E27FC236}">
+                <a16:creationId xmlns:a16="http://schemas.microsoft.com/office/drawing/2014/main" id="{F17C56FB-2732-45F0-9035-55BEAB46EC6A}"/>
+              </a:ext>
+            </a:extLst>
+          </p:cNvPr>
+          <p:cNvPicPr>
+            <a:picLocks noChangeAspect="1"/>
+          </p:cNvPicPr>
+          <p:nvPr/>
+        </p:nvPicPr>
+        <p:blipFill>
+          <a:blip r:embed="rId2">
+            <a:extLst>
+              <a:ext uri="{28A0092B-C50C-407E-A947-70E740481C1C}">
+                <a14:useLocalDpi xmlns:a14="http://schemas.microsoft.com/office/drawing/2010/main" val="0"/>
+              </a:ext>
+            </a:extLst>
+          </a:blip>
+          <a:stretch>
+            <a:fillRect/>
+          </a:stretch>
+        </p:blipFill>
+        <p:spPr>
+          <a:xfrm>
+            <a:off x="2285670" y="1142802"/>
+            <a:ext cx="7620660" cy="4572396"/>
+          </a:xfrm>
+          <a:prstGeom prst="rect">
+            <a:avLst/>
+          </a:prstGeom>
+        </p:spPr>
+      </p:pic>
+    </p:spTree>
+    <p:extLst>
+      <p:ext uri="{BB962C8B-B14F-4D97-AF65-F5344CB8AC3E}">
+        <p14:creationId xmlns:p14="http://schemas.microsoft.com/office/powerpoint/2010/main" val="3684001964"/>
+      </p:ext>
+    </p:extLst>
+  </p:cSld>
+  <p:clrMapOvr>
+    <a:masterClrMapping/>
+  </p:clrMapOvr>
+</p:sld>
+</file>
+
+<file path=ppt/slides/slide15.xml><?xml version="1.0" encoding="utf-8"?>
+<p:sld xmlns:a="http://schemas.openxmlformats.org/drawingml/2006/main" xmlns:r="http://schemas.openxmlformats.org/officeDocument/2006/relationships" xmlns:p="http://schemas.openxmlformats.org/presentationml/2006/main">
+  <p:cSld>
+    <p:spTree>
+      <p:nvGrpSpPr>
+        <p:cNvPr id="1" name=""/>
+        <p:cNvGrpSpPr/>
+        <p:nvPr/>
+      </p:nvGrpSpPr>
+      <p:grpSpPr>
+        <a:xfrm>
+          <a:off x="0" y="0"/>
+          <a:ext cx="0" cy="0"/>
+          <a:chOff x="0" y="0"/>
+          <a:chExt cx="0" cy="0"/>
+        </a:xfrm>
+      </p:grpSpPr>
+      <p:sp>
+        <p:nvSpPr>
+          <p:cNvPr id="5" name="Rectangle 4">
+            <a:extLst>
+              <a:ext uri="{FF2B5EF4-FFF2-40B4-BE49-F238E27FC236}">
+                <a16:creationId xmlns:a16="http://schemas.microsoft.com/office/drawing/2014/main" id="{A561EEED-B792-44E2-818C-90F789C91561}"/>
+              </a:ext>
+            </a:extLst>
+          </p:cNvPr>
+          <p:cNvSpPr/>
+          <p:nvPr/>
+        </p:nvSpPr>
+        <p:spPr>
+          <a:xfrm>
+            <a:off x="9901989" y="264695"/>
+            <a:ext cx="806116" cy="144379"/>
+          </a:xfrm>
+          <a:prstGeom prst="rect">
+            <a:avLst/>
+          </a:prstGeom>
+          <a:solidFill>
+            <a:schemeClr val="bg1"/>
+          </a:solidFill>
+          <a:ln>
+            <a:noFill/>
+          </a:ln>
+        </p:spPr>
+        <p:style>
+          <a:lnRef idx="2">
+            <a:schemeClr val="accent1">
+              <a:shade val="50000"/>
+            </a:schemeClr>
+          </a:lnRef>
+          <a:fillRef idx="1">
+            <a:schemeClr val="accent1"/>
+          </a:fillRef>
+          <a:effectRef idx="0">
+            <a:schemeClr val="accent1"/>
+          </a:effectRef>
+          <a:fontRef idx="minor">
+            <a:schemeClr val="lt1"/>
+          </a:fontRef>
+        </p:style>
+        <p:txBody>
+          <a:bodyPr rtlCol="0" anchor="ctr"/>
+          <a:lstStyle/>
+          <a:p>
+            <a:pPr algn="ctr"/>
+            <a:endParaRPr lang="en-US"/>
+          </a:p>
+        </p:txBody>
+      </p:sp>
+      <p:pic>
+        <p:nvPicPr>
+          <p:cNvPr id="3" name="Picture 2" descr="Graphical user interface, application&#10;&#10;Description automatically generated">
+            <a:extLst>
+              <a:ext uri="{FF2B5EF4-FFF2-40B4-BE49-F238E27FC236}">
+                <a16:creationId xmlns:a16="http://schemas.microsoft.com/office/drawing/2014/main" id="{3C48C2A2-A1B3-462C-B676-4C935A93254F}"/>
+              </a:ext>
+            </a:extLst>
+          </p:cNvPr>
+          <p:cNvPicPr>
+            <a:picLocks noChangeAspect="1"/>
+          </p:cNvPicPr>
+          <p:nvPr/>
+        </p:nvPicPr>
+        <p:blipFill>
+          <a:blip r:embed="rId2">
+            <a:extLst>
+              <a:ext uri="{28A0092B-C50C-407E-A947-70E740481C1C}">
+                <a14:useLocalDpi xmlns:a14="http://schemas.microsoft.com/office/drawing/2010/main" val="0"/>
+              </a:ext>
+            </a:extLst>
+          </a:blip>
+          <a:stretch>
+            <a:fillRect/>
+          </a:stretch>
+        </p:blipFill>
+        <p:spPr>
+          <a:xfrm>
+            <a:off x="3729785" y="2282090"/>
+            <a:ext cx="4732430" cy="2293819"/>
+          </a:xfrm>
+          <a:prstGeom prst="rect">
+            <a:avLst/>
+          </a:prstGeom>
+        </p:spPr>
+      </p:pic>
+    </p:spTree>
+    <p:extLst>
+      <p:ext uri="{BB962C8B-B14F-4D97-AF65-F5344CB8AC3E}">
+        <p14:creationId xmlns:p14="http://schemas.microsoft.com/office/powerpoint/2010/main" val="1603253536"/>
+      </p:ext>
+    </p:extLst>
+  </p:cSld>
+  <p:clrMapOvr>
+    <a:masterClrMapping/>
+  </p:clrMapOvr>
+</p:sld>
+</file>
+
+<file path=ppt/slides/slide16.xml><?xml version="1.0" encoding="utf-8"?>
+<p:sld xmlns:a="http://schemas.openxmlformats.org/drawingml/2006/main" xmlns:r="http://schemas.openxmlformats.org/officeDocument/2006/relationships" xmlns:p="http://schemas.openxmlformats.org/presentationml/2006/main">
+  <p:cSld>
+    <p:spTree>
+      <p:nvGrpSpPr>
+        <p:cNvPr id="1" name=""/>
+        <p:cNvGrpSpPr/>
+        <p:nvPr/>
+      </p:nvGrpSpPr>
+      <p:grpSpPr>
+        <a:xfrm>
+          <a:off x="0" y="0"/>
+          <a:ext cx="0" cy="0"/>
+          <a:chOff x="0" y="0"/>
+          <a:chExt cx="0" cy="0"/>
+        </a:xfrm>
+      </p:grpSpPr>
+      <p:sp>
+        <p:nvSpPr>
+          <p:cNvPr id="5" name="Rectangle 4">
+            <a:extLst>
+              <a:ext uri="{FF2B5EF4-FFF2-40B4-BE49-F238E27FC236}">
+                <a16:creationId xmlns:a16="http://schemas.microsoft.com/office/drawing/2014/main" id="{A561EEED-B792-44E2-818C-90F789C91561}"/>
+              </a:ext>
+            </a:extLst>
+          </p:cNvPr>
+          <p:cNvSpPr/>
+          <p:nvPr/>
+        </p:nvSpPr>
+        <p:spPr>
+          <a:xfrm>
+            <a:off x="9901989" y="264695"/>
+            <a:ext cx="806116" cy="144379"/>
+          </a:xfrm>
+          <a:prstGeom prst="rect">
+            <a:avLst/>
+          </a:prstGeom>
+          <a:solidFill>
+            <a:schemeClr val="bg1"/>
+          </a:solidFill>
+          <a:ln>
+            <a:noFill/>
+          </a:ln>
+        </p:spPr>
+        <p:style>
+          <a:lnRef idx="2">
+            <a:schemeClr val="accent1">
+              <a:shade val="50000"/>
+            </a:schemeClr>
+          </a:lnRef>
+          <a:fillRef idx="1">
+            <a:schemeClr val="accent1"/>
+          </a:fillRef>
+          <a:effectRef idx="0">
+            <a:schemeClr val="accent1"/>
+          </a:effectRef>
+          <a:fontRef idx="minor">
+            <a:schemeClr val="lt1"/>
+          </a:fontRef>
+        </p:style>
+        <p:txBody>
+          <a:bodyPr rtlCol="0" anchor="ctr"/>
+          <a:lstStyle/>
+          <a:p>
+            <a:pPr algn="ctr"/>
+            <a:endParaRPr lang="en-US"/>
+          </a:p>
+        </p:txBody>
+      </p:sp>
+      <p:pic>
+        <p:nvPicPr>
+          <p:cNvPr id="3" name="Picture 2" descr="Graphical user interface, application&#10;&#10;Description automatically generated">
+            <a:extLst>
+              <a:ext uri="{FF2B5EF4-FFF2-40B4-BE49-F238E27FC236}">
+                <a16:creationId xmlns:a16="http://schemas.microsoft.com/office/drawing/2014/main" id="{655FBD39-68A9-4620-A36C-5FCA41120EA2}"/>
+              </a:ext>
+            </a:extLst>
+          </p:cNvPr>
+          <p:cNvPicPr>
+            <a:picLocks noChangeAspect="1"/>
+          </p:cNvPicPr>
+          <p:nvPr/>
+        </p:nvPicPr>
+        <p:blipFill>
+          <a:blip r:embed="rId2">
+            <a:extLst>
+              <a:ext uri="{28A0092B-C50C-407E-A947-70E740481C1C}">
+                <a14:useLocalDpi xmlns:a14="http://schemas.microsoft.com/office/drawing/2010/main" val="0"/>
+              </a:ext>
+            </a:extLst>
+          </a:blip>
+          <a:stretch>
+            <a:fillRect/>
+          </a:stretch>
+        </p:blipFill>
+        <p:spPr>
+          <a:xfrm>
+            <a:off x="0" y="679275"/>
+            <a:ext cx="12192000" cy="5499450"/>
+          </a:xfrm>
+          <a:prstGeom prst="rect">
+            <a:avLst/>
+          </a:prstGeom>
+        </p:spPr>
+      </p:pic>
+    </p:spTree>
+    <p:extLst>
+      <p:ext uri="{BB962C8B-B14F-4D97-AF65-F5344CB8AC3E}">
+        <p14:creationId xmlns:p14="http://schemas.microsoft.com/office/powerpoint/2010/main" val="1720022828"/>
+      </p:ext>
+    </p:extLst>
+  </p:cSld>
+  <p:clrMapOvr>
+    <a:masterClrMapping/>
+  </p:clrMapOvr>
+</p:sld>
+</file>
+
+<file path=ppt/slides/slide17.xml><?xml version="1.0" encoding="utf-8"?>
+<p:sld xmlns:a="http://schemas.openxmlformats.org/drawingml/2006/main" xmlns:r="http://schemas.openxmlformats.org/officeDocument/2006/relationships" xmlns:p="http://schemas.openxmlformats.org/presentationml/2006/main">
+  <p:cSld>
+    <p:spTree>
+      <p:nvGrpSpPr>
+        <p:cNvPr id="1" name=""/>
+        <p:cNvGrpSpPr/>
+        <p:nvPr/>
+      </p:nvGrpSpPr>
+      <p:grpSpPr>
+        <a:xfrm>
+          <a:off x="0" y="0"/>
+          <a:ext cx="0" cy="0"/>
+          <a:chOff x="0" y="0"/>
+          <a:chExt cx="0" cy="0"/>
+        </a:xfrm>
+      </p:grpSpPr>
+      <p:sp>
+        <p:nvSpPr>
+          <p:cNvPr id="5" name="Rectangle 4">
+            <a:extLst>
+              <a:ext uri="{FF2B5EF4-FFF2-40B4-BE49-F238E27FC236}">
+                <a16:creationId xmlns:a16="http://schemas.microsoft.com/office/drawing/2014/main" id="{A561EEED-B792-44E2-818C-90F789C91561}"/>
+              </a:ext>
+            </a:extLst>
+          </p:cNvPr>
+          <p:cNvSpPr/>
+          <p:nvPr/>
+        </p:nvSpPr>
+        <p:spPr>
+          <a:xfrm>
+            <a:off x="9901989" y="264695"/>
+            <a:ext cx="806116" cy="144379"/>
+          </a:xfrm>
+          <a:prstGeom prst="rect">
+            <a:avLst/>
+          </a:prstGeom>
+          <a:solidFill>
+            <a:schemeClr val="bg1"/>
+          </a:solidFill>
+          <a:ln>
+            <a:noFill/>
+          </a:ln>
+        </p:spPr>
+        <p:style>
+          <a:lnRef idx="2">
+            <a:schemeClr val="accent1">
+              <a:shade val="50000"/>
+            </a:schemeClr>
+          </a:lnRef>
+          <a:fillRef idx="1">
+            <a:schemeClr val="accent1"/>
+          </a:fillRef>
+          <a:effectRef idx="0">
+            <a:schemeClr val="accent1"/>
+          </a:effectRef>
+          <a:fontRef idx="minor">
+            <a:schemeClr val="lt1"/>
+          </a:fontRef>
+        </p:style>
+        <p:txBody>
+          <a:bodyPr rtlCol="0" anchor="ctr"/>
+          <a:lstStyle/>
+          <a:p>
+            <a:pPr algn="ctr"/>
+            <a:endParaRPr lang="en-US"/>
+          </a:p>
+        </p:txBody>
+      </p:sp>
+      <p:pic>
+        <p:nvPicPr>
+          <p:cNvPr id="3" name="Picture 2" descr="Graphical user interface, application&#10;&#10;Description automatically generated">
+            <a:extLst>
+              <a:ext uri="{FF2B5EF4-FFF2-40B4-BE49-F238E27FC236}">
+                <a16:creationId xmlns:a16="http://schemas.microsoft.com/office/drawing/2014/main" id="{DD5147DD-80BA-4B26-BD4A-59782BDBBD97}"/>
+              </a:ext>
+            </a:extLst>
+          </p:cNvPr>
+          <p:cNvPicPr>
+            <a:picLocks noChangeAspect="1"/>
+          </p:cNvPicPr>
+          <p:nvPr/>
+        </p:nvPicPr>
+        <p:blipFill>
+          <a:blip r:embed="rId2">
+            <a:extLst>
+              <a:ext uri="{28A0092B-C50C-407E-A947-70E740481C1C}">
+                <a14:useLocalDpi xmlns:a14="http://schemas.microsoft.com/office/drawing/2010/main" val="0"/>
+              </a:ext>
+            </a:extLst>
+          </a:blip>
+          <a:stretch>
+            <a:fillRect/>
+          </a:stretch>
+        </p:blipFill>
+        <p:spPr>
+          <a:xfrm>
+            <a:off x="1460884" y="0"/>
+            <a:ext cx="9270232" cy="6858000"/>
+          </a:xfrm>
+          <a:prstGeom prst="rect">
+            <a:avLst/>
+          </a:prstGeom>
+        </p:spPr>
+      </p:pic>
+    </p:spTree>
+    <p:extLst>
+      <p:ext uri="{BB962C8B-B14F-4D97-AF65-F5344CB8AC3E}">
+        <p14:creationId xmlns:p14="http://schemas.microsoft.com/office/powerpoint/2010/main" val="1631930866"/>
+      </p:ext>
+    </p:extLst>
+  </p:cSld>
+  <p:clrMapOvr>
+    <a:masterClrMapping/>
+  </p:clrMapOvr>
+</p:sld>
+</file>
+
+<file path=ppt/slides/slide18.xml><?xml version="1.0" encoding="utf-8"?>
+<p:sld xmlns:a="http://schemas.openxmlformats.org/drawingml/2006/main" xmlns:r="http://schemas.openxmlformats.org/officeDocument/2006/relationships" xmlns:p="http://schemas.openxmlformats.org/presentationml/2006/main">
+  <p:cSld>
+    <p:spTree>
+      <p:nvGrpSpPr>
+        <p:cNvPr id="1" name=""/>
+        <p:cNvGrpSpPr/>
+        <p:nvPr/>
+      </p:nvGrpSpPr>
+      <p:grpSpPr>
+        <a:xfrm>
+          <a:off x="0" y="0"/>
+          <a:ext cx="0" cy="0"/>
+          <a:chOff x="0" y="0"/>
+          <a:chExt cx="0" cy="0"/>
+        </a:xfrm>
+      </p:grpSpPr>
+      <p:sp>
+        <p:nvSpPr>
+          <p:cNvPr id="5" name="Rectangle 4">
+            <a:extLst>
+              <a:ext uri="{FF2B5EF4-FFF2-40B4-BE49-F238E27FC236}">
+                <a16:creationId xmlns:a16="http://schemas.microsoft.com/office/drawing/2014/main" id="{A561EEED-B792-44E2-818C-90F789C91561}"/>
+              </a:ext>
+            </a:extLst>
+          </p:cNvPr>
+          <p:cNvSpPr/>
+          <p:nvPr/>
+        </p:nvSpPr>
+        <p:spPr>
+          <a:xfrm>
+            <a:off x="9901989" y="264695"/>
+            <a:ext cx="806116" cy="144379"/>
+          </a:xfrm>
+          <a:prstGeom prst="rect">
+            <a:avLst/>
+          </a:prstGeom>
+          <a:solidFill>
+            <a:schemeClr val="bg1"/>
+          </a:solidFill>
+          <a:ln>
+            <a:noFill/>
+          </a:ln>
+        </p:spPr>
+        <p:style>
+          <a:lnRef idx="2">
+            <a:schemeClr val="accent1">
+              <a:shade val="50000"/>
+            </a:schemeClr>
+          </a:lnRef>
+          <a:fillRef idx="1">
+            <a:schemeClr val="accent1"/>
+          </a:fillRef>
+          <a:effectRef idx="0">
+            <a:schemeClr val="accent1"/>
+          </a:effectRef>
+          <a:fontRef idx="minor">
+            <a:schemeClr val="lt1"/>
+          </a:fontRef>
+        </p:style>
+        <p:txBody>
+          <a:bodyPr rtlCol="0" anchor="ctr"/>
+          <a:lstStyle/>
+          <a:p>
+            <a:pPr algn="ctr"/>
+            <a:endParaRPr lang="en-US"/>
+          </a:p>
+        </p:txBody>
+      </p:sp>
+      <p:pic>
+        <p:nvPicPr>
+          <p:cNvPr id="3" name="Picture 2" descr="A picture containing text, indoor, screenshot&#10;&#10;Description automatically generated">
+            <a:extLst>
+              <a:ext uri="{FF2B5EF4-FFF2-40B4-BE49-F238E27FC236}">
+                <a16:creationId xmlns:a16="http://schemas.microsoft.com/office/drawing/2014/main" id="{5ABD777E-8347-4A6B-AAC8-EA46FD2BCFC1}"/>
+              </a:ext>
+            </a:extLst>
+          </p:cNvPr>
+          <p:cNvPicPr>
+            <a:picLocks noChangeAspect="1"/>
+          </p:cNvPicPr>
+          <p:nvPr/>
+        </p:nvPicPr>
+        <p:blipFill>
+          <a:blip r:embed="rId2">
+            <a:extLst>
+              <a:ext uri="{28A0092B-C50C-407E-A947-70E740481C1C}">
+                <a14:useLocalDpi xmlns:a14="http://schemas.microsoft.com/office/drawing/2010/main" val="0"/>
+              </a:ext>
+            </a:extLst>
+          </a:blip>
+          <a:stretch>
+            <a:fillRect/>
+          </a:stretch>
+        </p:blipFill>
+        <p:spPr>
+          <a:xfrm>
+            <a:off x="2285804" y="888869"/>
+            <a:ext cx="7620392" cy="5080261"/>
+          </a:xfrm>
+          <a:prstGeom prst="rect">
+            <a:avLst/>
+          </a:prstGeom>
+        </p:spPr>
+      </p:pic>
+    </p:spTree>
+    <p:extLst>
+      <p:ext uri="{BB962C8B-B14F-4D97-AF65-F5344CB8AC3E}">
+        <p14:creationId xmlns:p14="http://schemas.microsoft.com/office/powerpoint/2010/main" val="589724057"/>
+      </p:ext>
+    </p:extLst>
+  </p:cSld>
+  <p:clrMapOvr>
+    <a:masterClrMapping/>
+  </p:clrMapOvr>
+</p:sld>
+</file>
+
+<file path=ppt/slides/slide2.xml><?xml version="1.0" encoding="utf-8"?>
+<p:sld xmlns:a="http://schemas.openxmlformats.org/drawingml/2006/main" xmlns:r="http://schemas.openxmlformats.org/officeDocument/2006/relationships" xmlns:p="http://schemas.openxmlformats.org/presentationml/2006/main">
+  <p:cSld>
+    <p:spTree>
+      <p:nvGrpSpPr>
+        <p:cNvPr id="1" name=""/>
+        <p:cNvGrpSpPr/>
+        <p:nvPr/>
+      </p:nvGrpSpPr>
+      <p:grpSpPr>
+        <a:xfrm>
+          <a:off x="0" y="0"/>
+          <a:ext cx="0" cy="0"/>
+          <a:chOff x="0" y="0"/>
+          <a:chExt cx="0" cy="0"/>
+        </a:xfrm>
+      </p:grpSpPr>
+      <p:pic>
+        <p:nvPicPr>
+          <p:cNvPr id="4" name="Picture 3">
+            <a:extLst>
+              <a:ext uri="{FF2B5EF4-FFF2-40B4-BE49-F238E27FC236}">
+                <a16:creationId xmlns:a16="http://schemas.microsoft.com/office/drawing/2014/main" id="{CEDF9220-9703-4E2E-8F8C-53DB416F97B4}"/>
+              </a:ext>
+            </a:extLst>
+          </p:cNvPr>
+          <p:cNvPicPr>
+            <a:picLocks noChangeAspect="1"/>
+          </p:cNvPicPr>
+          <p:nvPr/>
+        </p:nvPicPr>
+        <p:blipFill>
+          <a:blip r:embed="rId2"/>
+          <a:stretch>
+            <a:fillRect/>
+          </a:stretch>
+        </p:blipFill>
+        <p:spPr>
+          <a:xfrm>
+            <a:off x="1285118" y="163322"/>
+            <a:ext cx="9422987" cy="6429983"/>
+          </a:xfrm>
+          <a:prstGeom prst="rect">
+            <a:avLst/>
+          </a:prstGeom>
+          <a:ln w="12700">
+            <a:solidFill>
+              <a:srgbClr val="C3C3C3"/>
+            </a:solidFill>
+          </a:ln>
+        </p:spPr>
+      </p:pic>
+      <p:sp>
+        <p:nvSpPr>
+          <p:cNvPr id="5" name="Rectangle 4">
+            <a:extLst>
+              <a:ext uri="{FF2B5EF4-FFF2-40B4-BE49-F238E27FC236}">
+                <a16:creationId xmlns:a16="http://schemas.microsoft.com/office/drawing/2014/main" id="{A561EEED-B792-44E2-818C-90F789C91561}"/>
+              </a:ext>
+            </a:extLst>
+          </p:cNvPr>
+          <p:cNvSpPr/>
+          <p:nvPr/>
+        </p:nvSpPr>
+        <p:spPr>
+          <a:xfrm>
+            <a:off x="9901989" y="264695"/>
+            <a:ext cx="806116" cy="144379"/>
+          </a:xfrm>
+          <a:prstGeom prst="rect">
+            <a:avLst/>
+          </a:prstGeom>
+          <a:solidFill>
+            <a:schemeClr val="bg1"/>
+          </a:solidFill>
+          <a:ln>
+            <a:noFill/>
+          </a:ln>
+        </p:spPr>
+        <p:style>
+          <a:lnRef idx="2">
+            <a:schemeClr val="accent1">
+              <a:shade val="50000"/>
+            </a:schemeClr>
+          </a:lnRef>
+          <a:fillRef idx="1">
+            <a:schemeClr val="accent1"/>
+          </a:fillRef>
+          <a:effectRef idx="0">
+            <a:schemeClr val="accent1"/>
+          </a:effectRef>
+          <a:fontRef idx="minor">
+            <a:schemeClr val="lt1"/>
+          </a:fontRef>
+        </p:style>
+        <p:txBody>
+          <a:bodyPr rtlCol="0" anchor="ctr"/>
+          <a:lstStyle/>
+          <a:p>
+            <a:pPr algn="ctr"/>
+            <a:endParaRPr lang="en-US"/>
+          </a:p>
+        </p:txBody>
+      </p:sp>
     </p:spTree>
     <p:extLst>
       <p:ext uri="{BB962C8B-B14F-4D97-AF65-F5344CB8AC3E}">
         <p14:creationId xmlns:p14="http://schemas.microsoft.com/office/powerpoint/2010/main" val="2996780424"/>
+      </p:ext>
+    </p:extLst>
+  </p:cSld>
+  <p:clrMapOvr>
+    <a:masterClrMapping/>
+  </p:clrMapOvr>
+</p:sld>
+</file>
+
+<file path=ppt/slides/slide3.xml><?xml version="1.0" encoding="utf-8"?>
+<p:sld xmlns:a="http://schemas.openxmlformats.org/drawingml/2006/main" xmlns:r="http://schemas.openxmlformats.org/officeDocument/2006/relationships" xmlns:p="http://schemas.openxmlformats.org/presentationml/2006/main">
+  <p:cSld>
+    <p:spTree>
+      <p:nvGrpSpPr>
+        <p:cNvPr id="1" name=""/>
+        <p:cNvGrpSpPr/>
+        <p:nvPr/>
+      </p:nvGrpSpPr>
+      <p:grpSpPr>
+        <a:xfrm>
+          <a:off x="0" y="0"/>
+          <a:ext cx="0" cy="0"/>
+          <a:chOff x="0" y="0"/>
+          <a:chExt cx="0" cy="0"/>
+        </a:xfrm>
+      </p:grpSpPr>
+      <p:sp>
+        <p:nvSpPr>
+          <p:cNvPr id="5" name="Rectangle 4">
+            <a:extLst>
+              <a:ext uri="{FF2B5EF4-FFF2-40B4-BE49-F238E27FC236}">
+                <a16:creationId xmlns:a16="http://schemas.microsoft.com/office/drawing/2014/main" id="{A561EEED-B792-44E2-818C-90F789C91561}"/>
+              </a:ext>
+            </a:extLst>
+          </p:cNvPr>
+          <p:cNvSpPr/>
+          <p:nvPr/>
+        </p:nvSpPr>
+        <p:spPr>
+          <a:xfrm>
+            <a:off x="9901989" y="264695"/>
+            <a:ext cx="806116" cy="144379"/>
+          </a:xfrm>
+          <a:prstGeom prst="rect">
+            <a:avLst/>
+          </a:prstGeom>
+          <a:solidFill>
+            <a:schemeClr val="bg1"/>
+          </a:solidFill>
+          <a:ln>
+            <a:noFill/>
+          </a:ln>
+        </p:spPr>
+        <p:style>
+          <a:lnRef idx="2">
+            <a:schemeClr val="accent1">
+              <a:shade val="50000"/>
+            </a:schemeClr>
+          </a:lnRef>
+          <a:fillRef idx="1">
+            <a:schemeClr val="accent1"/>
+          </a:fillRef>
+          <a:effectRef idx="0">
+            <a:schemeClr val="accent1"/>
+          </a:effectRef>
+          <a:fontRef idx="minor">
+            <a:schemeClr val="lt1"/>
+          </a:fontRef>
+        </p:style>
+        <p:txBody>
+          <a:bodyPr rtlCol="0" anchor="ctr"/>
+          <a:lstStyle/>
+          <a:p>
+            <a:pPr algn="ctr"/>
+            <a:endParaRPr lang="en-US"/>
+          </a:p>
+        </p:txBody>
+      </p:sp>
+      <p:pic>
+        <p:nvPicPr>
+          <p:cNvPr id="3" name="Picture 2" descr="Table&#10;&#10;Description automatically generated">
+            <a:extLst>
+              <a:ext uri="{FF2B5EF4-FFF2-40B4-BE49-F238E27FC236}">
+                <a16:creationId xmlns:a16="http://schemas.microsoft.com/office/drawing/2014/main" id="{F6ACD6FA-D685-4FA6-9654-854164BD9AC2}"/>
+              </a:ext>
+            </a:extLst>
+          </p:cNvPr>
+          <p:cNvPicPr>
+            <a:picLocks noChangeAspect="1"/>
+          </p:cNvPicPr>
+          <p:nvPr/>
+        </p:nvPicPr>
+        <p:blipFill>
+          <a:blip r:embed="rId2">
+            <a:extLst>
+              <a:ext uri="{28A0092B-C50C-407E-A947-70E740481C1C}">
+                <a14:useLocalDpi xmlns:a14="http://schemas.microsoft.com/office/drawing/2010/main" val="0"/>
+              </a:ext>
+            </a:extLst>
+          </a:blip>
+          <a:stretch>
+            <a:fillRect/>
+          </a:stretch>
+        </p:blipFill>
+        <p:spPr>
+          <a:xfrm>
+            <a:off x="2600762" y="1029000"/>
+            <a:ext cx="6990476" cy="4800000"/>
+          </a:xfrm>
+          <a:prstGeom prst="rect">
+            <a:avLst/>
+          </a:prstGeom>
+        </p:spPr>
+      </p:pic>
+    </p:spTree>
+    <p:extLst>
+      <p:ext uri="{BB962C8B-B14F-4D97-AF65-F5344CB8AC3E}">
+        <p14:creationId xmlns:p14="http://schemas.microsoft.com/office/powerpoint/2010/main" val="2346802560"/>
+      </p:ext>
+    </p:extLst>
+  </p:cSld>
+  <p:clrMapOvr>
+    <a:masterClrMapping/>
+  </p:clrMapOvr>
+</p:sld>
+</file>
+
+<file path=ppt/slides/slide4.xml><?xml version="1.0" encoding="utf-8"?>
+<p:sld xmlns:a="http://schemas.openxmlformats.org/drawingml/2006/main" xmlns:r="http://schemas.openxmlformats.org/officeDocument/2006/relationships" xmlns:p="http://schemas.openxmlformats.org/presentationml/2006/main">
+  <p:cSld>
+    <p:spTree>
+      <p:nvGrpSpPr>
+        <p:cNvPr id="1" name=""/>
+        <p:cNvGrpSpPr/>
+        <p:nvPr/>
+      </p:nvGrpSpPr>
+      <p:grpSpPr>
+        <a:xfrm>
+          <a:off x="0" y="0"/>
+          <a:ext cx="0" cy="0"/>
+          <a:chOff x="0" y="0"/>
+          <a:chExt cx="0" cy="0"/>
+        </a:xfrm>
+      </p:grpSpPr>
+      <p:sp>
+        <p:nvSpPr>
+          <p:cNvPr id="5" name="Rectangle 4">
+            <a:extLst>
+              <a:ext uri="{FF2B5EF4-FFF2-40B4-BE49-F238E27FC236}">
+                <a16:creationId xmlns:a16="http://schemas.microsoft.com/office/drawing/2014/main" id="{A561EEED-B792-44E2-818C-90F789C91561}"/>
+              </a:ext>
+            </a:extLst>
+          </p:cNvPr>
+          <p:cNvSpPr/>
+          <p:nvPr/>
+        </p:nvSpPr>
+        <p:spPr>
+          <a:xfrm>
+            <a:off x="9901989" y="264695"/>
+            <a:ext cx="806116" cy="144379"/>
+          </a:xfrm>
+          <a:prstGeom prst="rect">
+            <a:avLst/>
+          </a:prstGeom>
+          <a:solidFill>
+            <a:schemeClr val="bg1"/>
+          </a:solidFill>
+          <a:ln>
+            <a:noFill/>
+          </a:ln>
+        </p:spPr>
+        <p:style>
+          <a:lnRef idx="2">
+            <a:schemeClr val="accent1">
+              <a:shade val="50000"/>
+            </a:schemeClr>
+          </a:lnRef>
+          <a:fillRef idx="1">
+            <a:schemeClr val="accent1"/>
+          </a:fillRef>
+          <a:effectRef idx="0">
+            <a:schemeClr val="accent1"/>
+          </a:effectRef>
+          <a:fontRef idx="minor">
+            <a:schemeClr val="lt1"/>
+          </a:fontRef>
+        </p:style>
+        <p:txBody>
+          <a:bodyPr rtlCol="0" anchor="ctr"/>
+          <a:lstStyle/>
+          <a:p>
+            <a:pPr algn="ctr"/>
+            <a:endParaRPr lang="en-US"/>
+          </a:p>
+        </p:txBody>
+      </p:sp>
+      <p:pic>
+        <p:nvPicPr>
+          <p:cNvPr id="3" name="Picture 2" descr="A picture containing graphical user interface&#10;&#10;Description automatically generated">
+            <a:extLst>
+              <a:ext uri="{FF2B5EF4-FFF2-40B4-BE49-F238E27FC236}">
+                <a16:creationId xmlns:a16="http://schemas.microsoft.com/office/drawing/2014/main" id="{714CF1D0-133B-4C4F-8A77-FA13470A9671}"/>
+              </a:ext>
+            </a:extLst>
+          </p:cNvPr>
+          <p:cNvPicPr>
+            <a:picLocks noChangeAspect="1"/>
+          </p:cNvPicPr>
+          <p:nvPr/>
+        </p:nvPicPr>
+        <p:blipFill>
+          <a:blip r:embed="rId2">
+            <a:extLst>
+              <a:ext uri="{28A0092B-C50C-407E-A947-70E740481C1C}">
+                <a14:useLocalDpi xmlns:a14="http://schemas.microsoft.com/office/drawing/2010/main" val="0"/>
+              </a:ext>
+            </a:extLst>
+          </a:blip>
+          <a:stretch>
+            <a:fillRect/>
+          </a:stretch>
+        </p:blipFill>
+        <p:spPr>
+          <a:xfrm>
+            <a:off x="249610" y="0"/>
+            <a:ext cx="11692780" cy="6858000"/>
+          </a:xfrm>
+          <a:prstGeom prst="rect">
+            <a:avLst/>
+          </a:prstGeom>
+        </p:spPr>
+      </p:pic>
+    </p:spTree>
+    <p:extLst>
+      <p:ext uri="{BB962C8B-B14F-4D97-AF65-F5344CB8AC3E}">
+        <p14:creationId xmlns:p14="http://schemas.microsoft.com/office/powerpoint/2010/main" val="1429991334"/>
+      </p:ext>
+    </p:extLst>
+  </p:cSld>
+  <p:clrMapOvr>
+    <a:masterClrMapping/>
+  </p:clrMapOvr>
+</p:sld>
+</file>
+
+<file path=ppt/slides/slide5.xml><?xml version="1.0" encoding="utf-8"?>
+<p:sld xmlns:a="http://schemas.openxmlformats.org/drawingml/2006/main" xmlns:r="http://schemas.openxmlformats.org/officeDocument/2006/relationships" xmlns:p="http://schemas.openxmlformats.org/presentationml/2006/main">
+  <p:cSld>
+    <p:spTree>
+      <p:nvGrpSpPr>
+        <p:cNvPr id="1" name=""/>
+        <p:cNvGrpSpPr/>
+        <p:nvPr/>
+      </p:nvGrpSpPr>
+      <p:grpSpPr>
+        <a:xfrm>
+          <a:off x="0" y="0"/>
+          <a:ext cx="0" cy="0"/>
+          <a:chOff x="0" y="0"/>
+          <a:chExt cx="0" cy="0"/>
+        </a:xfrm>
+      </p:grpSpPr>
+      <p:sp>
+        <p:nvSpPr>
+          <p:cNvPr id="5" name="Rectangle 4">
+            <a:extLst>
+              <a:ext uri="{FF2B5EF4-FFF2-40B4-BE49-F238E27FC236}">
+                <a16:creationId xmlns:a16="http://schemas.microsoft.com/office/drawing/2014/main" id="{A561EEED-B792-44E2-818C-90F789C91561}"/>
+              </a:ext>
+            </a:extLst>
+          </p:cNvPr>
+          <p:cNvSpPr/>
+          <p:nvPr/>
+        </p:nvSpPr>
+        <p:spPr>
+          <a:xfrm>
+            <a:off x="9901989" y="264695"/>
+            <a:ext cx="806116" cy="144379"/>
+          </a:xfrm>
+          <a:prstGeom prst="rect">
+            <a:avLst/>
+          </a:prstGeom>
+          <a:solidFill>
+            <a:schemeClr val="bg1"/>
+          </a:solidFill>
+          <a:ln>
+            <a:noFill/>
+          </a:ln>
+        </p:spPr>
+        <p:style>
+          <a:lnRef idx="2">
+            <a:schemeClr val="accent1">
+              <a:shade val="50000"/>
+            </a:schemeClr>
+          </a:lnRef>
+          <a:fillRef idx="1">
+            <a:schemeClr val="accent1"/>
+          </a:fillRef>
+          <a:effectRef idx="0">
+            <a:schemeClr val="accent1"/>
+          </a:effectRef>
+          <a:fontRef idx="minor">
+            <a:schemeClr val="lt1"/>
+          </a:fontRef>
+        </p:style>
+        <p:txBody>
+          <a:bodyPr rtlCol="0" anchor="ctr"/>
+          <a:lstStyle/>
+          <a:p>
+            <a:pPr algn="ctr"/>
+            <a:endParaRPr lang="en-US"/>
+          </a:p>
+        </p:txBody>
+      </p:sp>
+      <p:pic>
+        <p:nvPicPr>
+          <p:cNvPr id="3" name="Picture 2" descr="Graphical user interface, application&#10;&#10;Description automatically generated">
+            <a:extLst>
+              <a:ext uri="{FF2B5EF4-FFF2-40B4-BE49-F238E27FC236}">
+                <a16:creationId xmlns:a16="http://schemas.microsoft.com/office/drawing/2014/main" id="{D401DA05-ED3C-4C19-AE40-8786D6EBD7AE}"/>
+              </a:ext>
+            </a:extLst>
+          </p:cNvPr>
+          <p:cNvPicPr>
+            <a:picLocks noChangeAspect="1"/>
+          </p:cNvPicPr>
+          <p:nvPr/>
+        </p:nvPicPr>
+        <p:blipFill>
+          <a:blip r:embed="rId2">
+            <a:extLst>
+              <a:ext uri="{28A0092B-C50C-407E-A947-70E740481C1C}">
+                <a14:useLocalDpi xmlns:a14="http://schemas.microsoft.com/office/drawing/2010/main" val="0"/>
+              </a:ext>
+            </a:extLst>
+          </a:blip>
+          <a:stretch>
+            <a:fillRect/>
+          </a:stretch>
+        </p:blipFill>
+        <p:spPr>
+          <a:xfrm>
+            <a:off x="2285804" y="1523902"/>
+            <a:ext cx="7620392" cy="3810196"/>
+          </a:xfrm>
+          <a:prstGeom prst="rect">
+            <a:avLst/>
+          </a:prstGeom>
+        </p:spPr>
+      </p:pic>
+    </p:spTree>
+    <p:extLst>
+      <p:ext uri="{BB962C8B-B14F-4D97-AF65-F5344CB8AC3E}">
+        <p14:creationId xmlns:p14="http://schemas.microsoft.com/office/powerpoint/2010/main" val="127045010"/>
+      </p:ext>
+    </p:extLst>
+  </p:cSld>
+  <p:clrMapOvr>
+    <a:masterClrMapping/>
+  </p:clrMapOvr>
+</p:sld>
+</file>
+
+<file path=ppt/slides/slide6.xml><?xml version="1.0" encoding="utf-8"?>
+<p:sld xmlns:a="http://schemas.openxmlformats.org/drawingml/2006/main" xmlns:r="http://schemas.openxmlformats.org/officeDocument/2006/relationships" xmlns:p="http://schemas.openxmlformats.org/presentationml/2006/main">
+  <p:cSld>
+    <p:spTree>
+      <p:nvGrpSpPr>
+        <p:cNvPr id="1" name=""/>
+        <p:cNvGrpSpPr/>
+        <p:nvPr/>
+      </p:nvGrpSpPr>
+      <p:grpSpPr>
+        <a:xfrm>
+          <a:off x="0" y="0"/>
+          <a:ext cx="0" cy="0"/>
+          <a:chOff x="0" y="0"/>
+          <a:chExt cx="0" cy="0"/>
+        </a:xfrm>
+      </p:grpSpPr>
+      <p:sp>
+        <p:nvSpPr>
+          <p:cNvPr id="5" name="Rectangle 4">
+            <a:extLst>
+              <a:ext uri="{FF2B5EF4-FFF2-40B4-BE49-F238E27FC236}">
+                <a16:creationId xmlns:a16="http://schemas.microsoft.com/office/drawing/2014/main" id="{A561EEED-B792-44E2-818C-90F789C91561}"/>
+              </a:ext>
+            </a:extLst>
+          </p:cNvPr>
+          <p:cNvSpPr/>
+          <p:nvPr/>
+        </p:nvSpPr>
+        <p:spPr>
+          <a:xfrm>
+            <a:off x="9901989" y="264695"/>
+            <a:ext cx="806116" cy="144379"/>
+          </a:xfrm>
+          <a:prstGeom prst="rect">
+            <a:avLst/>
+          </a:prstGeom>
+          <a:solidFill>
+            <a:schemeClr val="bg1"/>
+          </a:solidFill>
+          <a:ln>
+            <a:noFill/>
+          </a:ln>
+        </p:spPr>
+        <p:style>
+          <a:lnRef idx="2">
+            <a:schemeClr val="accent1">
+              <a:shade val="50000"/>
+            </a:schemeClr>
+          </a:lnRef>
+          <a:fillRef idx="1">
+            <a:schemeClr val="accent1"/>
+          </a:fillRef>
+          <a:effectRef idx="0">
+            <a:schemeClr val="accent1"/>
+          </a:effectRef>
+          <a:fontRef idx="minor">
+            <a:schemeClr val="lt1"/>
+          </a:fontRef>
+        </p:style>
+        <p:txBody>
+          <a:bodyPr rtlCol="0" anchor="ctr"/>
+          <a:lstStyle/>
+          <a:p>
+            <a:pPr algn="ctr"/>
+            <a:endParaRPr lang="en-US"/>
+          </a:p>
+        </p:txBody>
+      </p:sp>
+      <p:pic>
+        <p:nvPicPr>
+          <p:cNvPr id="3" name="Picture 2" descr="Graphical user interface, application, website&#10;&#10;Description automatically generated">
+            <a:extLst>
+              <a:ext uri="{FF2B5EF4-FFF2-40B4-BE49-F238E27FC236}">
+                <a16:creationId xmlns:a16="http://schemas.microsoft.com/office/drawing/2014/main" id="{2017F876-E729-4089-8129-19B3E8B0F905}"/>
+              </a:ext>
+            </a:extLst>
+          </p:cNvPr>
+          <p:cNvPicPr>
+            <a:picLocks noChangeAspect="1"/>
+          </p:cNvPicPr>
+          <p:nvPr/>
+        </p:nvPicPr>
+        <p:blipFill>
+          <a:blip r:embed="rId2">
+            <a:extLst>
+              <a:ext uri="{28A0092B-C50C-407E-A947-70E740481C1C}">
+                <a14:useLocalDpi xmlns:a14="http://schemas.microsoft.com/office/drawing/2010/main" val="0"/>
+              </a:ext>
+            </a:extLst>
+          </a:blip>
+          <a:stretch>
+            <a:fillRect/>
+          </a:stretch>
+        </p:blipFill>
+        <p:spPr>
+          <a:xfrm>
+            <a:off x="382017" y="0"/>
+            <a:ext cx="11427966" cy="6858000"/>
+          </a:xfrm>
+          <a:prstGeom prst="rect">
+            <a:avLst/>
+          </a:prstGeom>
+        </p:spPr>
+      </p:pic>
+    </p:spTree>
+    <p:extLst>
+      <p:ext uri="{BB962C8B-B14F-4D97-AF65-F5344CB8AC3E}">
+        <p14:creationId xmlns:p14="http://schemas.microsoft.com/office/powerpoint/2010/main" val="341438781"/>
+      </p:ext>
+    </p:extLst>
+  </p:cSld>
+  <p:clrMapOvr>
+    <a:masterClrMapping/>
+  </p:clrMapOvr>
+</p:sld>
+</file>
+
+<file path=ppt/slides/slide7.xml><?xml version="1.0" encoding="utf-8"?>
+<p:sld xmlns:a="http://schemas.openxmlformats.org/drawingml/2006/main" xmlns:r="http://schemas.openxmlformats.org/officeDocument/2006/relationships" xmlns:p="http://schemas.openxmlformats.org/presentationml/2006/main">
+  <p:cSld>
+    <p:spTree>
+      <p:nvGrpSpPr>
+        <p:cNvPr id="1" name=""/>
+        <p:cNvGrpSpPr/>
+        <p:nvPr/>
+      </p:nvGrpSpPr>
+      <p:grpSpPr>
+        <a:xfrm>
+          <a:off x="0" y="0"/>
+          <a:ext cx="0" cy="0"/>
+          <a:chOff x="0" y="0"/>
+          <a:chExt cx="0" cy="0"/>
+        </a:xfrm>
+      </p:grpSpPr>
+      <p:sp>
+        <p:nvSpPr>
+          <p:cNvPr id="5" name="Rectangle 4">
+            <a:extLst>
+              <a:ext uri="{FF2B5EF4-FFF2-40B4-BE49-F238E27FC236}">
+                <a16:creationId xmlns:a16="http://schemas.microsoft.com/office/drawing/2014/main" id="{A561EEED-B792-44E2-818C-90F789C91561}"/>
+              </a:ext>
+            </a:extLst>
+          </p:cNvPr>
+          <p:cNvSpPr/>
+          <p:nvPr/>
+        </p:nvSpPr>
+        <p:spPr>
+          <a:xfrm>
+            <a:off x="9901989" y="264695"/>
+            <a:ext cx="806116" cy="144379"/>
+          </a:xfrm>
+          <a:prstGeom prst="rect">
+            <a:avLst/>
+          </a:prstGeom>
+          <a:solidFill>
+            <a:schemeClr val="bg1"/>
+          </a:solidFill>
+          <a:ln>
+            <a:noFill/>
+          </a:ln>
+        </p:spPr>
+        <p:style>
+          <a:lnRef idx="2">
+            <a:schemeClr val="accent1">
+              <a:shade val="50000"/>
+            </a:schemeClr>
+          </a:lnRef>
+          <a:fillRef idx="1">
+            <a:schemeClr val="accent1"/>
+          </a:fillRef>
+          <a:effectRef idx="0">
+            <a:schemeClr val="accent1"/>
+          </a:effectRef>
+          <a:fontRef idx="minor">
+            <a:schemeClr val="lt1"/>
+          </a:fontRef>
+        </p:style>
+        <p:txBody>
+          <a:bodyPr rtlCol="0" anchor="ctr"/>
+          <a:lstStyle/>
+          <a:p>
+            <a:pPr algn="ctr"/>
+            <a:endParaRPr lang="en-US"/>
+          </a:p>
+        </p:txBody>
+      </p:sp>
+      <p:pic>
+        <p:nvPicPr>
+          <p:cNvPr id="3" name="Picture 2" descr="Graphical user interface, application&#10;&#10;Description automatically generated">
+            <a:extLst>
+              <a:ext uri="{FF2B5EF4-FFF2-40B4-BE49-F238E27FC236}">
+                <a16:creationId xmlns:a16="http://schemas.microsoft.com/office/drawing/2014/main" id="{00A43409-823F-483B-B25B-1B3EC7A4E556}"/>
+              </a:ext>
+            </a:extLst>
+          </p:cNvPr>
+          <p:cNvPicPr>
+            <a:picLocks noChangeAspect="1"/>
+          </p:cNvPicPr>
+          <p:nvPr/>
+        </p:nvPicPr>
+        <p:blipFill>
+          <a:blip r:embed="rId2">
+            <a:extLst>
+              <a:ext uri="{28A0092B-C50C-407E-A947-70E740481C1C}">
+                <a14:useLocalDpi xmlns:a14="http://schemas.microsoft.com/office/drawing/2010/main" val="0"/>
+              </a:ext>
+            </a:extLst>
+          </a:blip>
+          <a:stretch>
+            <a:fillRect/>
+          </a:stretch>
+        </p:blipFill>
+        <p:spPr>
+          <a:xfrm>
+            <a:off x="1041855" y="0"/>
+            <a:ext cx="10108290" cy="6858000"/>
+          </a:xfrm>
+          <a:prstGeom prst="rect">
+            <a:avLst/>
+          </a:prstGeom>
+        </p:spPr>
+      </p:pic>
+    </p:spTree>
+    <p:extLst>
+      <p:ext uri="{BB962C8B-B14F-4D97-AF65-F5344CB8AC3E}">
+        <p14:creationId xmlns:p14="http://schemas.microsoft.com/office/powerpoint/2010/main" val="305402555"/>
+      </p:ext>
+    </p:extLst>
+  </p:cSld>
+  <p:clrMapOvr>
+    <a:masterClrMapping/>
+  </p:clrMapOvr>
+</p:sld>
+</file>
+
+<file path=ppt/slides/slide8.xml><?xml version="1.0" encoding="utf-8"?>
+<p:sld xmlns:a="http://schemas.openxmlformats.org/drawingml/2006/main" xmlns:r="http://schemas.openxmlformats.org/officeDocument/2006/relationships" xmlns:p="http://schemas.openxmlformats.org/presentationml/2006/main">
+  <p:cSld>
+    <p:spTree>
+      <p:nvGrpSpPr>
+        <p:cNvPr id="1" name=""/>
+        <p:cNvGrpSpPr/>
+        <p:nvPr/>
+      </p:nvGrpSpPr>
+      <p:grpSpPr>
+        <a:xfrm>
+          <a:off x="0" y="0"/>
+          <a:ext cx="0" cy="0"/>
+          <a:chOff x="0" y="0"/>
+          <a:chExt cx="0" cy="0"/>
+        </a:xfrm>
+      </p:grpSpPr>
+      <p:sp>
+        <p:nvSpPr>
+          <p:cNvPr id="5" name="Rectangle 4">
+            <a:extLst>
+              <a:ext uri="{FF2B5EF4-FFF2-40B4-BE49-F238E27FC236}">
+                <a16:creationId xmlns:a16="http://schemas.microsoft.com/office/drawing/2014/main" id="{A561EEED-B792-44E2-818C-90F789C91561}"/>
+              </a:ext>
+            </a:extLst>
+          </p:cNvPr>
+          <p:cNvSpPr/>
+          <p:nvPr/>
+        </p:nvSpPr>
+        <p:spPr>
+          <a:xfrm>
+            <a:off x="9901989" y="264695"/>
+            <a:ext cx="806116" cy="144379"/>
+          </a:xfrm>
+          <a:prstGeom prst="rect">
+            <a:avLst/>
+          </a:prstGeom>
+          <a:solidFill>
+            <a:schemeClr val="bg1"/>
+          </a:solidFill>
+          <a:ln>
+            <a:noFill/>
+          </a:ln>
+        </p:spPr>
+        <p:style>
+          <a:lnRef idx="2">
+            <a:schemeClr val="accent1">
+              <a:shade val="50000"/>
+            </a:schemeClr>
+          </a:lnRef>
+          <a:fillRef idx="1">
+            <a:schemeClr val="accent1"/>
+          </a:fillRef>
+          <a:effectRef idx="0">
+            <a:schemeClr val="accent1"/>
+          </a:effectRef>
+          <a:fontRef idx="minor">
+            <a:schemeClr val="lt1"/>
+          </a:fontRef>
+        </p:style>
+        <p:txBody>
+          <a:bodyPr rtlCol="0" anchor="ctr"/>
+          <a:lstStyle/>
+          <a:p>
+            <a:pPr algn="ctr"/>
+            <a:endParaRPr lang="en-US"/>
+          </a:p>
+        </p:txBody>
+      </p:sp>
+      <p:pic>
+        <p:nvPicPr>
+          <p:cNvPr id="3" name="Picture 2" descr="Graphical user interface, application&#10;&#10;Description automatically generated">
+            <a:extLst>
+              <a:ext uri="{FF2B5EF4-FFF2-40B4-BE49-F238E27FC236}">
+                <a16:creationId xmlns:a16="http://schemas.microsoft.com/office/drawing/2014/main" id="{C28106D5-BEF4-4134-867B-0C294490905C}"/>
+              </a:ext>
+            </a:extLst>
+          </p:cNvPr>
+          <p:cNvPicPr>
+            <a:picLocks noChangeAspect="1"/>
+          </p:cNvPicPr>
+          <p:nvPr/>
+        </p:nvPicPr>
+        <p:blipFill>
+          <a:blip r:embed="rId2">
+            <a:extLst>
+              <a:ext uri="{28A0092B-C50C-407E-A947-70E740481C1C}">
+                <a14:useLocalDpi xmlns:a14="http://schemas.microsoft.com/office/drawing/2010/main" val="0"/>
+              </a:ext>
+            </a:extLst>
+          </a:blip>
+          <a:stretch>
+            <a:fillRect/>
+          </a:stretch>
+        </p:blipFill>
+        <p:spPr>
+          <a:xfrm>
+            <a:off x="1928753" y="0"/>
+            <a:ext cx="8334493" cy="6858000"/>
+          </a:xfrm>
+          <a:prstGeom prst="rect">
+            <a:avLst/>
+          </a:prstGeom>
+        </p:spPr>
+      </p:pic>
+    </p:spTree>
+    <p:extLst>
+      <p:ext uri="{BB962C8B-B14F-4D97-AF65-F5344CB8AC3E}">
+        <p14:creationId xmlns:p14="http://schemas.microsoft.com/office/powerpoint/2010/main" val="2902689392"/>
+      </p:ext>
+    </p:extLst>
+  </p:cSld>
+  <p:clrMapOvr>
+    <a:masterClrMapping/>
+  </p:clrMapOvr>
+</p:sld>
+</file>
+
+<file path=ppt/slides/slide9.xml><?xml version="1.0" encoding="utf-8"?>
+<p:sld xmlns:a="http://schemas.openxmlformats.org/drawingml/2006/main" xmlns:r="http://schemas.openxmlformats.org/officeDocument/2006/relationships" xmlns:p="http://schemas.openxmlformats.org/presentationml/2006/main">
+  <p:cSld>
+    <p:spTree>
+      <p:nvGrpSpPr>
+        <p:cNvPr id="1" name=""/>
+        <p:cNvGrpSpPr/>
+        <p:nvPr/>
+      </p:nvGrpSpPr>
+      <p:grpSpPr>
+        <a:xfrm>
+          <a:off x="0" y="0"/>
+          <a:ext cx="0" cy="0"/>
+          <a:chOff x="0" y="0"/>
+          <a:chExt cx="0" cy="0"/>
+        </a:xfrm>
+      </p:grpSpPr>
+      <p:sp>
+        <p:nvSpPr>
+          <p:cNvPr id="5" name="Rectangle 4">
+            <a:extLst>
+              <a:ext uri="{FF2B5EF4-FFF2-40B4-BE49-F238E27FC236}">
+                <a16:creationId xmlns:a16="http://schemas.microsoft.com/office/drawing/2014/main" id="{A561EEED-B792-44E2-818C-90F789C91561}"/>
+              </a:ext>
+            </a:extLst>
+          </p:cNvPr>
+          <p:cNvSpPr/>
+          <p:nvPr/>
+        </p:nvSpPr>
+        <p:spPr>
+          <a:xfrm>
+            <a:off x="9901989" y="264695"/>
+            <a:ext cx="806116" cy="144379"/>
+          </a:xfrm>
+          <a:prstGeom prst="rect">
+            <a:avLst/>
+          </a:prstGeom>
+          <a:solidFill>
+            <a:schemeClr val="bg1"/>
+          </a:solidFill>
+          <a:ln>
+            <a:noFill/>
+          </a:ln>
+        </p:spPr>
+        <p:style>
+          <a:lnRef idx="2">
+            <a:schemeClr val="accent1">
+              <a:shade val="50000"/>
+            </a:schemeClr>
+          </a:lnRef>
+          <a:fillRef idx="1">
+            <a:schemeClr val="accent1"/>
+          </a:fillRef>
+          <a:effectRef idx="0">
+            <a:schemeClr val="accent1"/>
+          </a:effectRef>
+          <a:fontRef idx="minor">
+            <a:schemeClr val="lt1"/>
+          </a:fontRef>
+        </p:style>
+        <p:txBody>
+          <a:bodyPr rtlCol="0" anchor="ctr"/>
+          <a:lstStyle/>
+          <a:p>
+            <a:pPr algn="ctr"/>
+            <a:endParaRPr lang="en-US"/>
+          </a:p>
+        </p:txBody>
+      </p:sp>
+      <p:pic>
+        <p:nvPicPr>
+          <p:cNvPr id="3" name="Picture 2" descr="Graphical user interface, application&#10;&#10;Description automatically generated">
+            <a:extLst>
+              <a:ext uri="{FF2B5EF4-FFF2-40B4-BE49-F238E27FC236}">
+                <a16:creationId xmlns:a16="http://schemas.microsoft.com/office/drawing/2014/main" id="{F0810426-3FA4-4EB7-93E4-B27A096514E6}"/>
+              </a:ext>
+            </a:extLst>
+          </p:cNvPr>
+          <p:cNvPicPr>
+            <a:picLocks noChangeAspect="1"/>
+          </p:cNvPicPr>
+          <p:nvPr/>
+        </p:nvPicPr>
+        <p:blipFill>
+          <a:blip r:embed="rId2">
+            <a:extLst>
+              <a:ext uri="{28A0092B-C50C-407E-A947-70E740481C1C}">
+                <a14:useLocalDpi xmlns:a14="http://schemas.microsoft.com/office/drawing/2010/main" val="0"/>
+              </a:ext>
+            </a:extLst>
+          </a:blip>
+          <a:stretch>
+            <a:fillRect/>
+          </a:stretch>
+        </p:blipFill>
+        <p:spPr>
+          <a:xfrm>
+            <a:off x="2672190" y="371857"/>
+            <a:ext cx="6847619" cy="6114286"/>
+          </a:xfrm>
+          <a:prstGeom prst="rect">
+            <a:avLst/>
+          </a:prstGeom>
+        </p:spPr>
+      </p:pic>
+    </p:spTree>
+    <p:extLst>
+      <p:ext uri="{BB962C8B-B14F-4D97-AF65-F5344CB8AC3E}">
+        <p14:creationId xmlns:p14="http://schemas.microsoft.com/office/powerpoint/2010/main" val="1499336570"/>
       </p:ext>
     </p:extLst>
   </p:cSld>
@@ -4632,4 +6536,195 @@
     </a:ext>
   </a:extLst>
 </a:theme>
+</file>
+
+<file path=customXml/item1.xml><?xml version="1.0" encoding="utf-8"?>
+<ct:contentTypeSchema xmlns:ct="http://schemas.microsoft.com/office/2006/metadata/contentType" xmlns:ma="http://schemas.microsoft.com/office/2006/metadata/properties/metaAttributes" ct:_="" ma:_="" ma:contentTypeName="Document" ma:contentTypeID="0x010100E3FD940EE2838B45AB993ADA34E4783D" ma:contentTypeVersion="7" ma:contentTypeDescription="Create a new document." ma:contentTypeScope="" ma:versionID="ade2e80b87cb37ba6f94e81c3365b849">
+  <xsd:schema xmlns:xsd="http://www.w3.org/2001/XMLSchema" xmlns:xs="http://www.w3.org/2001/XMLSchema" xmlns:p="http://schemas.microsoft.com/office/2006/metadata/properties" xmlns:ns2="08b54382-c677-4449-98d7-b90ff4f4e33a" targetNamespace="http://schemas.microsoft.com/office/2006/metadata/properties" ma:root="true" ma:fieldsID="ff2a7fbf0c0a09b394f21031231ef037" ns2:_="">
+    <xsd:import namespace="08b54382-c677-4449-98d7-b90ff4f4e33a"/>
+    <xsd:element name="properties">
+      <xsd:complexType>
+        <xsd:sequence>
+          <xsd:element name="documentManagement">
+            <xsd:complexType>
+              <xsd:all>
+                <xsd:element ref="ns2:MediaServiceMetadata" minOccurs="0"/>
+                <xsd:element ref="ns2:MediaServiceFastMetadata" minOccurs="0"/>
+                <xsd:element ref="ns2:MediaServiceAutoTags" minOccurs="0"/>
+                <xsd:element ref="ns2:MediaServiceOCR" minOccurs="0"/>
+                <xsd:element ref="ns2:MediaServiceGenerationTime" minOccurs="0"/>
+                <xsd:element ref="ns2:MediaServiceEventHashCode" minOccurs="0"/>
+                <xsd:element ref="ns2:MediaServiceDateTaken" minOccurs="0"/>
+              </xsd:all>
+            </xsd:complexType>
+          </xsd:element>
+        </xsd:sequence>
+      </xsd:complexType>
+    </xsd:element>
+  </xsd:schema>
+  <xsd:schema xmlns:xsd="http://www.w3.org/2001/XMLSchema" xmlns:xs="http://www.w3.org/2001/XMLSchema" xmlns:dms="http://schemas.microsoft.com/office/2006/documentManagement/types" xmlns:pc="http://schemas.microsoft.com/office/infopath/2007/PartnerControls" targetNamespace="08b54382-c677-4449-98d7-b90ff4f4e33a" elementFormDefault="qualified">
+    <xsd:import namespace="http://schemas.microsoft.com/office/2006/documentManagement/types"/>
+    <xsd:import namespace="http://schemas.microsoft.com/office/infopath/2007/PartnerControls"/>
+    <xsd:element name="MediaServiceMetadata" ma:index="8" nillable="true" ma:displayName="MediaServiceMetadata" ma:hidden="true" ma:internalName="MediaServiceMetadata" ma:readOnly="true">
+      <xsd:simpleType>
+        <xsd:restriction base="dms:Note"/>
+      </xsd:simpleType>
+    </xsd:element>
+    <xsd:element name="MediaServiceFastMetadata" ma:index="9" nillable="true" ma:displayName="MediaServiceFastMetadata" ma:hidden="true" ma:internalName="MediaServiceFastMetadata" ma:readOnly="true">
+      <xsd:simpleType>
+        <xsd:restriction base="dms:Note"/>
+      </xsd:simpleType>
+    </xsd:element>
+    <xsd:element name="MediaServiceAutoTags" ma:index="10" nillable="true" ma:displayName="Tags" ma:internalName="MediaServiceAutoTags" ma:readOnly="true">
+      <xsd:simpleType>
+        <xsd:restriction base="dms:Text"/>
+      </xsd:simpleType>
+    </xsd:element>
+    <xsd:element name="MediaServiceOCR" ma:index="11" nillable="true" ma:displayName="Extracted Text" ma:internalName="MediaServiceOCR" ma:readOnly="true">
+      <xsd:simpleType>
+        <xsd:restriction base="dms:Note">
+          <xsd:maxLength value="255"/>
+        </xsd:restriction>
+      </xsd:simpleType>
+    </xsd:element>
+    <xsd:element name="MediaServiceGenerationTime" ma:index="12" nillable="true" ma:displayName="MediaServiceGenerationTime" ma:hidden="true" ma:internalName="MediaServiceGenerationTime" ma:readOnly="true">
+      <xsd:simpleType>
+        <xsd:restriction base="dms:Text"/>
+      </xsd:simpleType>
+    </xsd:element>
+    <xsd:element name="MediaServiceEventHashCode" ma:index="13" nillable="true" ma:displayName="MediaServiceEventHashCode" ma:hidden="true" ma:internalName="MediaServiceEventHashCode" ma:readOnly="true">
+      <xsd:simpleType>
+        <xsd:restriction base="dms:Text"/>
+      </xsd:simpleType>
+    </xsd:element>
+    <xsd:element name="MediaServiceDateTaken" ma:index="14" nillable="true" ma:displayName="MediaServiceDateTaken" ma:hidden="true" ma:internalName="MediaServiceDateTaken" ma:readOnly="true">
+      <xsd:simpleType>
+        <xsd:restriction base="dms:Text"/>
+      </xsd:simpleType>
+    </xsd:element>
+  </xsd:schema>
+  <xsd:schema xmlns="http://schemas.openxmlformats.org/package/2006/metadata/core-properties" xmlns:xsd="http://www.w3.org/2001/XMLSchema" xmlns:xsi="http://www.w3.org/2001/XMLSchema-instance" xmlns:dc="http://purl.org/dc/elements/1.1/" xmlns:dcterms="http://purl.org/dc/terms/" xmlns:odoc="http://schemas.microsoft.com/internal/obd" targetNamespace="http://schemas.openxmlformats.org/package/2006/metadata/core-properties" elementFormDefault="qualified" attributeFormDefault="unqualified" blockDefault="#all">
+    <xsd:import namespace="http://purl.org/dc/elements/1.1/" schemaLocation="http://dublincore.org/schemas/xmls/qdc/2003/04/02/dc.xsd"/>
+    <xsd:import namespace="http://purl.org/dc/terms/" schemaLocation="http://dublincore.org/schemas/xmls/qdc/2003/04/02/dcterms.xsd"/>
+    <xsd:element name="coreProperties" type="CT_coreProperties"/>
+    <xsd:complexType name="CT_coreProperties">
+      <xsd:all>
+        <xsd:element ref="dc:creator" minOccurs="0" maxOccurs="1"/>
+        <xsd:element ref="dcterms:created" minOccurs="0" maxOccurs="1"/>
+        <xsd:element ref="dc:identifier" minOccurs="0" maxOccurs="1"/>
+        <xsd:element name="contentType" minOccurs="0" maxOccurs="1" type="xsd:string" ma:index="0" ma:displayName="Content Type"/>
+        <xsd:element ref="dc:title" minOccurs="0" maxOccurs="1" ma:index="4" ma:displayName="Title"/>
+        <xsd:element ref="dc:subject" minOccurs="0" maxOccurs="1"/>
+        <xsd:element ref="dc:description" minOccurs="0" maxOccurs="1"/>
+        <xsd:element name="keywords" minOccurs="0" maxOccurs="1" type="xsd:string"/>
+        <xsd:element ref="dc:language" minOccurs="0" maxOccurs="1"/>
+        <xsd:element name="category" minOccurs="0" maxOccurs="1" type="xsd:string"/>
+        <xsd:element name="version" minOccurs="0" maxOccurs="1" type="xsd:string"/>
+        <xsd:element name="revision" minOccurs="0" maxOccurs="1" type="xsd:string">
+          <xsd:annotation>
+            <xsd:documentation>
+                        This value indicates the number of saves or revisions. The application is responsible for updating this value after each revision.
+                    </xsd:documentation>
+          </xsd:annotation>
+        </xsd:element>
+        <xsd:element name="lastModifiedBy" minOccurs="0" maxOccurs="1" type="xsd:string"/>
+        <xsd:element ref="dcterms:modified" minOccurs="0" maxOccurs="1"/>
+        <xsd:element name="contentStatus" minOccurs="0" maxOccurs="1" type="xsd:string"/>
+      </xsd:all>
+    </xsd:complexType>
+  </xsd:schema>
+  <xs:schema xmlns:pc="http://schemas.microsoft.com/office/infopath/2007/PartnerControls" xmlns:xs="http://www.w3.org/2001/XMLSchema" targetNamespace="http://schemas.microsoft.com/office/infopath/2007/PartnerControls" elementFormDefault="qualified" attributeFormDefault="unqualified">
+    <xs:element name="Person">
+      <xs:complexType>
+        <xs:sequence>
+          <xs:element ref="pc:DisplayName" minOccurs="0"/>
+          <xs:element ref="pc:AccountId" minOccurs="0"/>
+          <xs:element ref="pc:AccountType" minOccurs="0"/>
+        </xs:sequence>
+      </xs:complexType>
+    </xs:element>
+    <xs:element name="DisplayName" type="xs:string"/>
+    <xs:element name="AccountId" type="xs:string"/>
+    <xs:element name="AccountType" type="xs:string"/>
+    <xs:element name="BDCAssociatedEntity">
+      <xs:complexType>
+        <xs:sequence>
+          <xs:element ref="pc:BDCEntity" minOccurs="0" maxOccurs="unbounded"/>
+        </xs:sequence>
+        <xs:attribute ref="pc:EntityNamespace"/>
+        <xs:attribute ref="pc:EntityName"/>
+        <xs:attribute ref="pc:SystemInstanceName"/>
+        <xs:attribute ref="pc:AssociationName"/>
+      </xs:complexType>
+    </xs:element>
+    <xs:attribute name="EntityNamespace" type="xs:string"/>
+    <xs:attribute name="EntityName" type="xs:string"/>
+    <xs:attribute name="SystemInstanceName" type="xs:string"/>
+    <xs:attribute name="AssociationName" type="xs:string"/>
+    <xs:element name="BDCEntity">
+      <xs:complexType>
+        <xs:sequence>
+          <xs:element ref="pc:EntityDisplayName" minOccurs="0"/>
+          <xs:element ref="pc:EntityInstanceReference" minOccurs="0"/>
+          <xs:element ref="pc:EntityId1" minOccurs="0"/>
+          <xs:element ref="pc:EntityId2" minOccurs="0"/>
+          <xs:element ref="pc:EntityId3" minOccurs="0"/>
+          <xs:element ref="pc:EntityId4" minOccurs="0"/>
+          <xs:element ref="pc:EntityId5" minOccurs="0"/>
+        </xs:sequence>
+      </xs:complexType>
+    </xs:element>
+    <xs:element name="EntityDisplayName" type="xs:string"/>
+    <xs:element name="EntityInstanceReference" type="xs:string"/>
+    <xs:element name="EntityId1" type="xs:string"/>
+    <xs:element name="EntityId2" type="xs:string"/>
+    <xs:element name="EntityId3" type="xs:string"/>
+    <xs:element name="EntityId4" type="xs:string"/>
+    <xs:element name="EntityId5" type="xs:string"/>
+    <xs:element name="Terms">
+      <xs:complexType>
+        <xs:sequence>
+          <xs:element ref="pc:TermInfo" minOccurs="0" maxOccurs="unbounded"/>
+        </xs:sequence>
+      </xs:complexType>
+    </xs:element>
+    <xs:element name="TermInfo">
+      <xs:complexType>
+        <xs:sequence>
+          <xs:element ref="pc:TermName" minOccurs="0"/>
+          <xs:element ref="pc:TermId" minOccurs="0"/>
+        </xs:sequence>
+      </xs:complexType>
+    </xs:element>
+    <xs:element name="TermName" type="xs:string"/>
+    <xs:element name="TermId" type="xs:string"/>
+  </xs:schema>
+</ct:contentTypeSchema>
+</file>
+
+<file path=customXml/item2.xml><?xml version="1.0" encoding="utf-8"?>
+<?mso-contentType ?>
+<FormTemplates xmlns="http://schemas.microsoft.com/sharepoint/v3/contenttype/forms">
+  <Display>DocumentLibraryForm</Display>
+  <Edit>DocumentLibraryForm</Edit>
+  <New>DocumentLibraryForm</New>
+</FormTemplates>
+</file>
+
+<file path=customXml/item3.xml><?xml version="1.0" encoding="utf-8"?>
+<p:properties xmlns:p="http://schemas.microsoft.com/office/2006/metadata/properties" xmlns:xsi="http://www.w3.org/2001/XMLSchema-instance" xmlns:pc="http://schemas.microsoft.com/office/infopath/2007/PartnerControls">
+  <documentManagement/>
+</p:properties>
+</file>
+
+<file path=customXml/itemProps1.xml><?xml version="1.0" encoding="utf-8"?>
+<ds:datastoreItem xmlns:ds="http://schemas.openxmlformats.org/officeDocument/2006/customXml" ds:itemID="{B5959731-7366-4BAA-B15E-F6D90D3F57F9}"/>
+</file>
+
+<file path=customXml/itemProps2.xml><?xml version="1.0" encoding="utf-8"?>
+<ds:datastoreItem xmlns:ds="http://schemas.openxmlformats.org/officeDocument/2006/customXml" ds:itemID="{417DD099-F574-414B-A777-A32B0C54CBBD}"/>
+</file>
+
+<file path=customXml/itemProps3.xml><?xml version="1.0" encoding="utf-8"?>
+<ds:datastoreItem xmlns:ds="http://schemas.openxmlformats.org/officeDocument/2006/customXml" ds:itemID="{58C26C02-EEB4-451D-A8F8-135F495B8DBA}"/>
 </file>
</xml_diff>

<commit_message>
Obvience module update for get-started-with-power-bi
</commit_message>
<xml_diff>
--- a/learn-bizapps-pr/power-bi/get-started-with-power-bi/media-layered/source-get-started-with-power-bi.pptx
+++ b/learn-bizapps-pr/power-bi/get-started-with-power-bi/media-layered/source-get-started-with-power-bi.pptx
@@ -6539,9 +6539,10 @@
 </file>
 
 <file path=customXml/item1.xml><?xml version="1.0" encoding="utf-8"?>
-<ct:contentTypeSchema xmlns:ct="http://schemas.microsoft.com/office/2006/metadata/contentType" xmlns:ma="http://schemas.microsoft.com/office/2006/metadata/properties/metaAttributes" ct:_="" ma:_="" ma:contentTypeName="Document" ma:contentTypeID="0x010100E3FD940EE2838B45AB993ADA34E4783D" ma:contentTypeVersion="7" ma:contentTypeDescription="Create a new document." ma:contentTypeScope="" ma:versionID="ade2e80b87cb37ba6f94e81c3365b849">
-  <xsd:schema xmlns:xsd="http://www.w3.org/2001/XMLSchema" xmlns:xs="http://www.w3.org/2001/XMLSchema" xmlns:p="http://schemas.microsoft.com/office/2006/metadata/properties" xmlns:ns2="08b54382-c677-4449-98d7-b90ff4f4e33a" targetNamespace="http://schemas.microsoft.com/office/2006/metadata/properties" ma:root="true" ma:fieldsID="ff2a7fbf0c0a09b394f21031231ef037" ns2:_="">
+<ct:contentTypeSchema xmlns:ct="http://schemas.microsoft.com/office/2006/metadata/contentType" xmlns:ma="http://schemas.microsoft.com/office/2006/metadata/properties/metaAttributes" ct:_="" ma:_="" ma:contentTypeName="Document" ma:contentTypeID="0x010100E3FD940EE2838B45AB993ADA34E4783D" ma:contentTypeVersion="9" ma:contentTypeDescription="Create a new document." ma:contentTypeScope="" ma:versionID="fb4c92668b331ef2be652c655b024a28">
+  <xsd:schema xmlns:xsd="http://www.w3.org/2001/XMLSchema" xmlns:xs="http://www.w3.org/2001/XMLSchema" xmlns:p="http://schemas.microsoft.com/office/2006/metadata/properties" xmlns:ns2="08b54382-c677-4449-98d7-b90ff4f4e33a" xmlns:ns3="524f4cd7-fc88-4682-9bfe-01e6e2450dda" targetNamespace="http://schemas.microsoft.com/office/2006/metadata/properties" ma:root="true" ma:fieldsID="dae59fe713e246407929ea41af4359d0" ns2:_="" ns3:_="">
     <xsd:import namespace="08b54382-c677-4449-98d7-b90ff4f4e33a"/>
+    <xsd:import namespace="524f4cd7-fc88-4682-9bfe-01e6e2450dda"/>
     <xsd:element name="properties">
       <xsd:complexType>
         <xsd:sequence>
@@ -6555,6 +6556,8 @@
                 <xsd:element ref="ns2:MediaServiceGenerationTime" minOccurs="0"/>
                 <xsd:element ref="ns2:MediaServiceEventHashCode" minOccurs="0"/>
                 <xsd:element ref="ns2:MediaServiceDateTaken" minOccurs="0"/>
+                <xsd:element ref="ns3:SharedWithUsers" minOccurs="0"/>
+                <xsd:element ref="ns3:SharedWithDetails" minOccurs="0"/>
               </xsd:all>
             </xsd:complexType>
           </xsd:element>
@@ -6600,6 +6603,36 @@
     <xsd:element name="MediaServiceDateTaken" ma:index="14" nillable="true" ma:displayName="MediaServiceDateTaken" ma:hidden="true" ma:internalName="MediaServiceDateTaken" ma:readOnly="true">
       <xsd:simpleType>
         <xsd:restriction base="dms:Text"/>
+      </xsd:simpleType>
+    </xsd:element>
+  </xsd:schema>
+  <xsd:schema xmlns:xsd="http://www.w3.org/2001/XMLSchema" xmlns:xs="http://www.w3.org/2001/XMLSchema" xmlns:dms="http://schemas.microsoft.com/office/2006/documentManagement/types" xmlns:pc="http://schemas.microsoft.com/office/infopath/2007/PartnerControls" targetNamespace="524f4cd7-fc88-4682-9bfe-01e6e2450dda" elementFormDefault="qualified">
+    <xsd:import namespace="http://schemas.microsoft.com/office/2006/documentManagement/types"/>
+    <xsd:import namespace="http://schemas.microsoft.com/office/infopath/2007/PartnerControls"/>
+    <xsd:element name="SharedWithUsers" ma:index="15" nillable="true" ma:displayName="Shared With" ma:internalName="SharedWithUsers" ma:readOnly="true">
+      <xsd:complexType>
+        <xsd:complexContent>
+          <xsd:extension base="dms:UserMulti">
+            <xsd:sequence>
+              <xsd:element name="UserInfo" minOccurs="0" maxOccurs="unbounded">
+                <xsd:complexType>
+                  <xsd:sequence>
+                    <xsd:element name="DisplayName" type="xsd:string" minOccurs="0"/>
+                    <xsd:element name="AccountId" type="dms:UserId" minOccurs="0" nillable="true"/>
+                    <xsd:element name="AccountType" type="xsd:string" minOccurs="0"/>
+                  </xsd:sequence>
+                </xsd:complexType>
+              </xsd:element>
+            </xsd:sequence>
+          </xsd:extension>
+        </xsd:complexContent>
+      </xsd:complexType>
+    </xsd:element>
+    <xsd:element name="SharedWithDetails" ma:index="16" nillable="true" ma:displayName="Shared With Details" ma:internalName="SharedWithDetails" ma:readOnly="true">
+      <xsd:simpleType>
+        <xsd:restriction base="dms:Note">
+          <xsd:maxLength value="255"/>
+        </xsd:restriction>
       </xsd:simpleType>
     </xsd:element>
   </xsd:schema>
@@ -6718,13 +6751,13 @@
 </file>
 
 <file path=customXml/itemProps1.xml><?xml version="1.0" encoding="utf-8"?>
-<ds:datastoreItem xmlns:ds="http://schemas.openxmlformats.org/officeDocument/2006/customXml" ds:itemID="{B5959731-7366-4BAA-B15E-F6D90D3F57F9}"/>
+<ds:datastoreItem xmlns:ds="http://schemas.openxmlformats.org/officeDocument/2006/customXml" ds:itemID="{CF6B94ED-6DC8-47C6-A51F-564A6237AE03}"/>
 </file>
 
 <file path=customXml/itemProps2.xml><?xml version="1.0" encoding="utf-8"?>
-<ds:datastoreItem xmlns:ds="http://schemas.openxmlformats.org/officeDocument/2006/customXml" ds:itemID="{417DD099-F574-414B-A777-A32B0C54CBBD}"/>
+<ds:datastoreItem xmlns:ds="http://schemas.openxmlformats.org/officeDocument/2006/customXml" ds:itemID="{2290FB46-2AAC-45CC-B79A-75846402039A}"/>
 </file>
 
 <file path=customXml/itemProps3.xml><?xml version="1.0" encoding="utf-8"?>
-<ds:datastoreItem xmlns:ds="http://schemas.openxmlformats.org/officeDocument/2006/customXml" ds:itemID="{58C26C02-EEB4-451D-A8F8-135F495B8DBA}"/>
+<ds:datastoreItem xmlns:ds="http://schemas.openxmlformats.org/officeDocument/2006/customXml" ds:itemID="{414A567D-33AB-45B6-A535-13BA40229CA2}"/>
 </file>
</xml_diff>